<commit_message>
Add PNG previews for Q6 and Q7 shape transformations
</commit_message>
<xml_diff>
--- a/math-shapes-quiz-complete.pptx
+++ b/math-shapes-quiz-complete.pptx
@@ -5133,7 +5133,7 @@
                   <a:srgbClr val="66B3FF"/>
                 </a:solidFill>
               </a:rPr>
-              <a:t>How can you make a different shape using the same parts? (Hexagon + Triangle)</a:t>
+              <a:t>How can you make a different shape using the same parts?</a:t>
             </a:r>
             <a:endParaRPr lang="en-US" sz="1800" dirty="0"/>
           </a:p>
@@ -5141,14 +5141,222 @@
       </p:sp>
       <p:sp>
         <p:nvSpPr>
-          <p:cNvPr id="4" name="Shape 2"/>
-          <p:cNvSpPr/>
-          <p:nvPr/>
-        </p:nvSpPr>
-        <p:spPr>
-          <a:xfrm>
-            <a:off x="457200" y="1645920"/>
-            <a:ext cx="3840480" cy="1005840"/>
+          <p:cNvPr id="4" name="Text 2"/>
+          <p:cNvSpPr/>
+          <p:nvPr/>
+        </p:nvSpPr>
+        <p:spPr>
+          <a:xfrm>
+            <a:off x="640080" y="822960"/>
+            <a:ext cx="1828800" cy="274320"/>
+          </a:xfrm>
+          <a:prstGeom prst="rect">
+            <a:avLst/>
+          </a:prstGeom>
+          <a:noFill/>
+          <a:ln/>
+        </p:spPr>
+        <p:txBody>
+          <a:bodyPr wrap="square" rtlCol="0" anchor="ctr"/>
+          <a:lstStyle/>
+          <a:p>
+            <a:pPr indent="0" marL="0">
+              <a:buNone/>
+            </a:pPr>
+            <a:r>
+              <a:rPr lang="en-US" sz="1400" i="1" dirty="0">
+                <a:solidFill>
+                  <a:srgbClr val="E0E0E0"/>
+                </a:solidFill>
+              </a:rPr>
+              <a:t>Given shapes:</a:t>
+            </a:r>
+            <a:endParaRPr lang="en-US" sz="1400" dirty="0"/>
+          </a:p>
+        </p:txBody>
+      </p:sp>
+      <p:sp>
+        <p:nvSpPr>
+          <p:cNvPr id="5" name="Shape 3"/>
+          <p:cNvSpPr/>
+          <p:nvPr/>
+        </p:nvSpPr>
+        <p:spPr>
+          <a:xfrm>
+            <a:off x="1051560" y="1129330"/>
+            <a:ext cx="274320" cy="118781"/>
+          </a:xfrm>
+          <a:prstGeom prst="rect">
+            <a:avLst/>
+          </a:prstGeom>
+          <a:solidFill>
+            <a:srgbClr val="66B3FF"/>
+          </a:solidFill>
+          <a:ln w="12700">
+            <a:solidFill>
+              <a:srgbClr val="000000"/>
+            </a:solidFill>
+            <a:prstDash val="solid"/>
+          </a:ln>
+        </p:spPr>
+      </p:sp>
+      <p:sp>
+        <p:nvSpPr>
+          <p:cNvPr id="6" name="Shape 4"/>
+          <p:cNvSpPr/>
+          <p:nvPr/>
+        </p:nvSpPr>
+        <p:spPr>
+          <a:xfrm flipV="1">
+            <a:off x="1051560" y="1069939"/>
+            <a:ext cx="274320" cy="59390"/>
+          </a:xfrm>
+          <a:prstGeom prst="triangle">
+            <a:avLst/>
+          </a:prstGeom>
+          <a:solidFill>
+            <a:srgbClr val="66B3FF"/>
+          </a:solidFill>
+          <a:ln w="12700">
+            <a:solidFill>
+              <a:srgbClr val="333333"/>
+            </a:solidFill>
+            <a:prstDash val="solid"/>
+          </a:ln>
+        </p:spPr>
+      </p:sp>
+      <p:sp>
+        <p:nvSpPr>
+          <p:cNvPr id="7" name="Shape 5"/>
+          <p:cNvSpPr/>
+          <p:nvPr/>
+        </p:nvSpPr>
+        <p:spPr>
+          <a:xfrm>
+            <a:off x="1051560" y="1248110"/>
+            <a:ext cx="274320" cy="59390"/>
+          </a:xfrm>
+          <a:prstGeom prst="triangle">
+            <a:avLst/>
+          </a:prstGeom>
+          <a:solidFill>
+            <a:srgbClr val="66B3FF"/>
+          </a:solidFill>
+          <a:ln w="12700">
+            <a:solidFill>
+              <a:srgbClr val="333333"/>
+            </a:solidFill>
+            <a:prstDash val="solid"/>
+          </a:ln>
+        </p:spPr>
+      </p:sp>
+      <p:sp>
+        <p:nvSpPr>
+          <p:cNvPr id="8" name="Text 6"/>
+          <p:cNvSpPr/>
+          <p:nvPr/>
+        </p:nvSpPr>
+        <p:spPr>
+          <a:xfrm>
+            <a:off x="1051560" y="1353221"/>
+            <a:ext cx="274320" cy="182880"/>
+          </a:xfrm>
+          <a:prstGeom prst="rect">
+            <a:avLst/>
+          </a:prstGeom>
+          <a:noFill/>
+          <a:ln/>
+        </p:spPr>
+        <p:txBody>
+          <a:bodyPr wrap="square" rtlCol="0" anchor="ctr"/>
+          <a:lstStyle/>
+          <a:p>
+            <a:pPr algn="ctr" indent="0" marL="0">
+              <a:buNone/>
+            </a:pPr>
+            <a:r>
+              <a:rPr lang="en-US" sz="1000" dirty="0">
+                <a:solidFill>
+                  <a:srgbClr val="E0E0E0"/>
+                </a:solidFill>
+              </a:rPr>
+              <a:t>Hexagon</a:t>
+            </a:r>
+            <a:endParaRPr lang="en-US" sz="1000" dirty="0"/>
+          </a:p>
+        </p:txBody>
+      </p:sp>
+      <p:sp>
+        <p:nvSpPr>
+          <p:cNvPr id="9" name="Shape 7"/>
+          <p:cNvSpPr/>
+          <p:nvPr/>
+        </p:nvSpPr>
+        <p:spPr>
+          <a:xfrm>
+            <a:off x="2103120" y="1051560"/>
+            <a:ext cx="365760" cy="365760"/>
+          </a:xfrm>
+          <a:prstGeom prst="triangle">
+            <a:avLst/>
+          </a:prstGeom>
+          <a:solidFill>
+            <a:srgbClr val="66B3FF"/>
+          </a:solidFill>
+          <a:ln w="12700">
+            <a:solidFill>
+              <a:srgbClr val="000000"/>
+            </a:solidFill>
+            <a:prstDash val="solid"/>
+          </a:ln>
+        </p:spPr>
+      </p:sp>
+      <p:sp>
+        <p:nvSpPr>
+          <p:cNvPr id="10" name="Text 8"/>
+          <p:cNvSpPr/>
+          <p:nvPr/>
+        </p:nvSpPr>
+        <p:spPr>
+          <a:xfrm>
+            <a:off x="2103120" y="1463040"/>
+            <a:ext cx="365760" cy="182880"/>
+          </a:xfrm>
+          <a:prstGeom prst="rect">
+            <a:avLst/>
+          </a:prstGeom>
+          <a:noFill/>
+          <a:ln/>
+        </p:spPr>
+        <p:txBody>
+          <a:bodyPr wrap="square" rtlCol="0" anchor="ctr"/>
+          <a:lstStyle/>
+          <a:p>
+            <a:pPr algn="ctr" indent="0" marL="0">
+              <a:buNone/>
+            </a:pPr>
+            <a:r>
+              <a:rPr lang="en-US" sz="1000" dirty="0">
+                <a:solidFill>
+                  <a:srgbClr val="E0E0E0"/>
+                </a:solidFill>
+              </a:rPr>
+              <a:t>Triangle</a:t>
+            </a:r>
+            <a:endParaRPr lang="en-US" sz="1000" dirty="0"/>
+          </a:p>
+        </p:txBody>
+      </p:sp>
+      <p:sp>
+        <p:nvSpPr>
+          <p:cNvPr id="11" name="Shape 9"/>
+          <p:cNvSpPr/>
+          <p:nvPr/>
+        </p:nvSpPr>
+        <p:spPr>
+          <a:xfrm>
+            <a:off x="457200" y="2011680"/>
+            <a:ext cx="3840480" cy="1188720"/>
           </a:xfrm>
           <a:prstGeom prst="rect">
             <a:avLst/>
@@ -5166,13 +5374,13 @@
       </p:sp>
       <p:sp>
         <p:nvSpPr>
-          <p:cNvPr id="5" name="Text 3"/>
-          <p:cNvSpPr/>
-          <p:nvPr/>
-        </p:nvSpPr>
-        <p:spPr>
-          <a:xfrm>
-            <a:off x="548640" y="1737360"/>
+          <p:cNvPr id="12" name="Text 10"/>
+          <p:cNvSpPr/>
+          <p:nvPr/>
+        </p:nvSpPr>
+        <p:spPr>
+          <a:xfrm>
+            <a:off x="548640" y="2103120"/>
             <a:ext cx="274320" cy="274320"/>
           </a:xfrm>
           <a:prstGeom prst="rect">
@@ -5204,19 +5412,146 @@
       </p:sp>
       <p:sp>
         <p:nvSpPr>
-          <p:cNvPr id="6" name="Text 4"/>
-          <p:cNvSpPr/>
-          <p:nvPr/>
-        </p:nvSpPr>
-        <p:spPr>
-          <a:xfrm>
-            <a:off x="914400" y="2011680"/>
-            <a:ext cx="3200400" cy="457200"/>
-          </a:xfrm>
-          <a:prstGeom prst="rect">
-            <a:avLst/>
-          </a:prstGeom>
-          <a:noFill/>
+          <p:cNvPr id="13" name="Shape 11"/>
+          <p:cNvSpPr/>
+          <p:nvPr/>
+        </p:nvSpPr>
+        <p:spPr>
+          <a:xfrm>
+            <a:off x="1691640" y="2500930"/>
+            <a:ext cx="274320" cy="118781"/>
+          </a:xfrm>
+          <a:prstGeom prst="rect">
+            <a:avLst/>
+          </a:prstGeom>
+          <a:solidFill>
+            <a:srgbClr val="FF9999"/>
+          </a:solidFill>
+          <a:ln w="12700">
+            <a:solidFill>
+              <a:srgbClr val="000000"/>
+            </a:solidFill>
+            <a:prstDash val="solid"/>
+          </a:ln>
+        </p:spPr>
+      </p:sp>
+      <p:sp>
+        <p:nvSpPr>
+          <p:cNvPr id="14" name="Shape 12"/>
+          <p:cNvSpPr/>
+          <p:nvPr/>
+        </p:nvSpPr>
+        <p:spPr>
+          <a:xfrm flipV="1">
+            <a:off x="1691640" y="2441539"/>
+            <a:ext cx="274320" cy="59390"/>
+          </a:xfrm>
+          <a:prstGeom prst="triangle">
+            <a:avLst/>
+          </a:prstGeom>
+          <a:solidFill>
+            <a:srgbClr val="FF9999"/>
+          </a:solidFill>
+          <a:ln w="12700">
+            <a:solidFill>
+              <a:srgbClr val="333333"/>
+            </a:solidFill>
+            <a:prstDash val="solid"/>
+          </a:ln>
+        </p:spPr>
+      </p:sp>
+      <p:sp>
+        <p:nvSpPr>
+          <p:cNvPr id="15" name="Shape 13"/>
+          <p:cNvSpPr/>
+          <p:nvPr/>
+        </p:nvSpPr>
+        <p:spPr>
+          <a:xfrm>
+            <a:off x="1691640" y="2619710"/>
+            <a:ext cx="274320" cy="59390"/>
+          </a:xfrm>
+          <a:prstGeom prst="triangle">
+            <a:avLst/>
+          </a:prstGeom>
+          <a:solidFill>
+            <a:srgbClr val="FF9999"/>
+          </a:solidFill>
+          <a:ln w="12700">
+            <a:solidFill>
+              <a:srgbClr val="333333"/>
+            </a:solidFill>
+            <a:prstDash val="solid"/>
+          </a:ln>
+        </p:spPr>
+      </p:sp>
+      <p:sp>
+        <p:nvSpPr>
+          <p:cNvPr id="16" name="Shape 14"/>
+          <p:cNvSpPr/>
+          <p:nvPr/>
+        </p:nvSpPr>
+        <p:spPr>
+          <a:xfrm>
+            <a:off x="2194560" y="2468880"/>
+            <a:ext cx="274320" cy="274320"/>
+          </a:xfrm>
+          <a:prstGeom prst="triangle">
+            <a:avLst/>
+          </a:prstGeom>
+          <a:solidFill>
+            <a:srgbClr val="FF9999"/>
+          </a:solidFill>
+          <a:ln w="12700">
+            <a:solidFill>
+              <a:srgbClr val="000000"/>
+            </a:solidFill>
+            <a:prstDash val="solid"/>
+          </a:ln>
+        </p:spPr>
+      </p:sp>
+      <p:sp>
+        <p:nvSpPr>
+          <p:cNvPr id="17" name="Shape 15"/>
+          <p:cNvSpPr/>
+          <p:nvPr/>
+        </p:nvSpPr>
+        <p:spPr>
+          <a:xfrm>
+            <a:off x="4754880" y="2011680"/>
+            <a:ext cx="3840480" cy="1188720"/>
+          </a:xfrm>
+          <a:prstGeom prst="rect">
+            <a:avLst/>
+          </a:prstGeom>
+          <a:solidFill>
+            <a:srgbClr val="2A2A2A"/>
+          </a:solidFill>
+          <a:ln w="12700">
+            <a:solidFill>
+              <a:srgbClr val="555555"/>
+            </a:solidFill>
+            <a:prstDash val="solid"/>
+          </a:ln>
+        </p:spPr>
+      </p:sp>
+      <p:sp>
+        <p:nvSpPr>
+          <p:cNvPr id="18" name="Text 16"/>
+          <p:cNvSpPr/>
+          <p:nvPr/>
+        </p:nvSpPr>
+        <p:spPr>
+          <a:xfrm>
+            <a:off x="4846320" y="2103120"/>
+            <a:ext cx="274320" cy="274320"/>
+          </a:xfrm>
+          <a:prstGeom prst="rect">
+            <a:avLst/>
+          </a:prstGeom>
+          <a:solidFill>
+            <a:srgbClr val="66B3FF"/>
+          </a:solidFill>
           <a:ln/>
         </p:spPr>
         <p:txBody>
@@ -5227,27 +5562,127 @@
               <a:buNone/>
             </a:pPr>
             <a:r>
-              <a:rPr lang="en-US" sz="1200" dirty="0">
-                <a:solidFill>
-                  <a:srgbClr val="E0E0E0"/>
-                </a:solidFill>
-              </a:rPr>
-              <a:t>Transformation 1</a:t>
-            </a:r>
-            <a:endParaRPr lang="en-US" sz="1200" dirty="0"/>
-          </a:p>
-        </p:txBody>
-      </p:sp>
-      <p:sp>
-        <p:nvSpPr>
-          <p:cNvPr id="7" name="Shape 5"/>
-          <p:cNvSpPr/>
-          <p:nvPr/>
-        </p:nvSpPr>
-        <p:spPr>
-          <a:xfrm>
-            <a:off x="4754880" y="1645920"/>
-            <a:ext cx="3840480" cy="1005840"/>
+              <a:rPr lang="en-US" sz="1600" b="1" dirty="0">
+                <a:solidFill>
+                  <a:srgbClr val="FFFFFF"/>
+                </a:solidFill>
+              </a:rPr>
+              <a:t>B</a:t>
+            </a:r>
+            <a:endParaRPr lang="en-US" sz="1600" dirty="0"/>
+          </a:p>
+        </p:txBody>
+      </p:sp>
+      <p:sp>
+        <p:nvSpPr>
+          <p:cNvPr id="19" name="Shape 17"/>
+          <p:cNvSpPr/>
+          <p:nvPr/>
+        </p:nvSpPr>
+        <p:spPr>
+          <a:xfrm>
+            <a:off x="6446520" y="2683810"/>
+            <a:ext cx="274320" cy="118781"/>
+          </a:xfrm>
+          <a:prstGeom prst="rect">
+            <a:avLst/>
+          </a:prstGeom>
+          <a:solidFill>
+            <a:srgbClr val="66B3FF"/>
+          </a:solidFill>
+          <a:ln w="12700">
+            <a:solidFill>
+              <a:srgbClr val="000000"/>
+            </a:solidFill>
+            <a:prstDash val="solid"/>
+          </a:ln>
+        </p:spPr>
+      </p:sp>
+      <p:sp>
+        <p:nvSpPr>
+          <p:cNvPr id="20" name="Shape 18"/>
+          <p:cNvSpPr/>
+          <p:nvPr/>
+        </p:nvSpPr>
+        <p:spPr>
+          <a:xfrm flipV="1">
+            <a:off x="6446520" y="2624419"/>
+            <a:ext cx="274320" cy="59390"/>
+          </a:xfrm>
+          <a:prstGeom prst="triangle">
+            <a:avLst/>
+          </a:prstGeom>
+          <a:solidFill>
+            <a:srgbClr val="66B3FF"/>
+          </a:solidFill>
+          <a:ln w="12700">
+            <a:solidFill>
+              <a:srgbClr val="333333"/>
+            </a:solidFill>
+            <a:prstDash val="solid"/>
+          </a:ln>
+        </p:spPr>
+      </p:sp>
+      <p:sp>
+        <p:nvSpPr>
+          <p:cNvPr id="21" name="Shape 19"/>
+          <p:cNvSpPr/>
+          <p:nvPr/>
+        </p:nvSpPr>
+        <p:spPr>
+          <a:xfrm>
+            <a:off x="6446520" y="2802590"/>
+            <a:ext cx="274320" cy="59390"/>
+          </a:xfrm>
+          <a:prstGeom prst="triangle">
+            <a:avLst/>
+          </a:prstGeom>
+          <a:solidFill>
+            <a:srgbClr val="66B3FF"/>
+          </a:solidFill>
+          <a:ln w="12700">
+            <a:solidFill>
+              <a:srgbClr val="333333"/>
+            </a:solidFill>
+            <a:prstDash val="solid"/>
+          </a:ln>
+        </p:spPr>
+      </p:sp>
+      <p:sp>
+        <p:nvSpPr>
+          <p:cNvPr id="22" name="Shape 20"/>
+          <p:cNvSpPr/>
+          <p:nvPr/>
+        </p:nvSpPr>
+        <p:spPr>
+          <a:xfrm flipV="1">
+            <a:off x="6446520" y="2331720"/>
+            <a:ext cx="274320" cy="274320"/>
+          </a:xfrm>
+          <a:prstGeom prst="triangle">
+            <a:avLst/>
+          </a:prstGeom>
+          <a:solidFill>
+            <a:srgbClr val="66B3FF"/>
+          </a:solidFill>
+          <a:ln w="12700">
+            <a:solidFill>
+              <a:srgbClr val="000000"/>
+            </a:solidFill>
+            <a:prstDash val="solid"/>
+          </a:ln>
+        </p:spPr>
+      </p:sp>
+      <p:sp>
+        <p:nvSpPr>
+          <p:cNvPr id="23" name="Shape 21"/>
+          <p:cNvSpPr/>
+          <p:nvPr/>
+        </p:nvSpPr>
+        <p:spPr>
+          <a:xfrm>
+            <a:off x="457200" y="3383280"/>
+            <a:ext cx="3840480" cy="1188720"/>
           </a:xfrm>
           <a:prstGeom prst="rect">
             <a:avLst/>
@@ -5265,20 +5700,20 @@
       </p:sp>
       <p:sp>
         <p:nvSpPr>
-          <p:cNvPr id="8" name="Text 6"/>
-          <p:cNvSpPr/>
-          <p:nvPr/>
-        </p:nvSpPr>
-        <p:spPr>
-          <a:xfrm>
-            <a:off x="4846320" y="1737360"/>
+          <p:cNvPr id="24" name="Text 22"/>
+          <p:cNvSpPr/>
+          <p:nvPr/>
+        </p:nvSpPr>
+        <p:spPr>
+          <a:xfrm>
+            <a:off x="548640" y="3474720"/>
             <a:ext cx="274320" cy="274320"/>
           </a:xfrm>
           <a:prstGeom prst="rect">
             <a:avLst/>
           </a:prstGeom>
           <a:solidFill>
-            <a:srgbClr val="66B3FF"/>
+            <a:srgbClr val="FF9999"/>
           </a:solidFill>
           <a:ln/>
         </p:spPr>
@@ -5295,7 +5730,7 @@
                   <a:srgbClr val="FFFFFF"/>
                 </a:solidFill>
               </a:rPr>
-              <a:t>B</a:t>
+              <a:t>C</a:t>
             </a:r>
             <a:endParaRPr lang="en-US" sz="1600" dirty="0"/>
           </a:p>
@@ -5303,19 +5738,146 @@
       </p:sp>
       <p:sp>
         <p:nvSpPr>
-          <p:cNvPr id="9" name="Text 7"/>
-          <p:cNvSpPr/>
-          <p:nvPr/>
-        </p:nvSpPr>
-        <p:spPr>
-          <a:xfrm>
-            <a:off x="5212080" y="2011680"/>
-            <a:ext cx="3200400" cy="457200"/>
-          </a:xfrm>
-          <a:prstGeom prst="rect">
-            <a:avLst/>
-          </a:prstGeom>
-          <a:noFill/>
+          <p:cNvPr id="25" name="Shape 23"/>
+          <p:cNvSpPr/>
+          <p:nvPr/>
+        </p:nvSpPr>
+        <p:spPr>
+          <a:xfrm>
+            <a:off x="1691640" y="3689650"/>
+            <a:ext cx="274320" cy="118781"/>
+          </a:xfrm>
+          <a:prstGeom prst="rect">
+            <a:avLst/>
+          </a:prstGeom>
+          <a:solidFill>
+            <a:srgbClr val="FF9999"/>
+          </a:solidFill>
+          <a:ln w="12700">
+            <a:solidFill>
+              <a:srgbClr val="000000"/>
+            </a:solidFill>
+            <a:prstDash val="solid"/>
+          </a:ln>
+        </p:spPr>
+      </p:sp>
+      <p:sp>
+        <p:nvSpPr>
+          <p:cNvPr id="26" name="Shape 24"/>
+          <p:cNvSpPr/>
+          <p:nvPr/>
+        </p:nvSpPr>
+        <p:spPr>
+          <a:xfrm flipV="1">
+            <a:off x="1691640" y="3630259"/>
+            <a:ext cx="274320" cy="59390"/>
+          </a:xfrm>
+          <a:prstGeom prst="triangle">
+            <a:avLst/>
+          </a:prstGeom>
+          <a:solidFill>
+            <a:srgbClr val="FF9999"/>
+          </a:solidFill>
+          <a:ln w="12700">
+            <a:solidFill>
+              <a:srgbClr val="333333"/>
+            </a:solidFill>
+            <a:prstDash val="solid"/>
+          </a:ln>
+        </p:spPr>
+      </p:sp>
+      <p:sp>
+        <p:nvSpPr>
+          <p:cNvPr id="27" name="Shape 25"/>
+          <p:cNvSpPr/>
+          <p:nvPr/>
+        </p:nvSpPr>
+        <p:spPr>
+          <a:xfrm>
+            <a:off x="1691640" y="3808430"/>
+            <a:ext cx="274320" cy="59390"/>
+          </a:xfrm>
+          <a:prstGeom prst="triangle">
+            <a:avLst/>
+          </a:prstGeom>
+          <a:solidFill>
+            <a:srgbClr val="FF9999"/>
+          </a:solidFill>
+          <a:ln w="12700">
+            <a:solidFill>
+              <a:srgbClr val="333333"/>
+            </a:solidFill>
+            <a:prstDash val="solid"/>
+          </a:ln>
+        </p:spPr>
+      </p:sp>
+      <p:sp>
+        <p:nvSpPr>
+          <p:cNvPr id="28" name="Shape 26"/>
+          <p:cNvSpPr/>
+          <p:nvPr/>
+        </p:nvSpPr>
+        <p:spPr>
+          <a:xfrm>
+            <a:off x="1691640" y="4069080"/>
+            <a:ext cx="274320" cy="274320"/>
+          </a:xfrm>
+          <a:prstGeom prst="triangle">
+            <a:avLst/>
+          </a:prstGeom>
+          <a:solidFill>
+            <a:srgbClr val="FF9999"/>
+          </a:solidFill>
+          <a:ln w="12700">
+            <a:solidFill>
+              <a:srgbClr val="000000"/>
+            </a:solidFill>
+            <a:prstDash val="solid"/>
+          </a:ln>
+        </p:spPr>
+      </p:sp>
+      <p:sp>
+        <p:nvSpPr>
+          <p:cNvPr id="29" name="Shape 27"/>
+          <p:cNvSpPr/>
+          <p:nvPr/>
+        </p:nvSpPr>
+        <p:spPr>
+          <a:xfrm>
+            <a:off x="4754880" y="3383280"/>
+            <a:ext cx="3840480" cy="1188720"/>
+          </a:xfrm>
+          <a:prstGeom prst="rect">
+            <a:avLst/>
+          </a:prstGeom>
+          <a:solidFill>
+            <a:srgbClr val="2A2A2A"/>
+          </a:solidFill>
+          <a:ln w="12700">
+            <a:solidFill>
+              <a:srgbClr val="555555"/>
+            </a:solidFill>
+            <a:prstDash val="solid"/>
+          </a:ln>
+        </p:spPr>
+      </p:sp>
+      <p:sp>
+        <p:nvSpPr>
+          <p:cNvPr id="30" name="Text 28"/>
+          <p:cNvSpPr/>
+          <p:nvPr/>
+        </p:nvSpPr>
+        <p:spPr>
+          <a:xfrm>
+            <a:off x="4846320" y="3474720"/>
+            <a:ext cx="274320" cy="274320"/>
+          </a:xfrm>
+          <a:prstGeom prst="rect">
+            <a:avLst/>
+          </a:prstGeom>
+          <a:solidFill>
+            <a:srgbClr val="FF9999"/>
+          </a:solidFill>
           <a:ln/>
         </p:spPr>
         <p:txBody>
@@ -5326,218 +5888,120 @@
               <a:buNone/>
             </a:pPr>
             <a:r>
-              <a:rPr lang="en-US" sz="1200" dirty="0">
-                <a:solidFill>
-                  <a:srgbClr val="E0E0E0"/>
-                </a:solidFill>
-              </a:rPr>
-              <a:t>Transformation 2 (Correct)</a:t>
-            </a:r>
-            <a:endParaRPr lang="en-US" sz="1200" dirty="0"/>
-          </a:p>
-        </p:txBody>
-      </p:sp>
-      <p:sp>
-        <p:nvSpPr>
-          <p:cNvPr id="10" name="Shape 8"/>
-          <p:cNvSpPr/>
-          <p:nvPr/>
-        </p:nvSpPr>
-        <p:spPr>
-          <a:xfrm>
-            <a:off x="457200" y="2834640"/>
-            <a:ext cx="3840480" cy="1005840"/>
-          </a:xfrm>
-          <a:prstGeom prst="rect">
-            <a:avLst/>
-          </a:prstGeom>
-          <a:solidFill>
-            <a:srgbClr val="2A2A2A"/>
-          </a:solidFill>
-          <a:ln w="12700">
-            <a:solidFill>
-              <a:srgbClr val="555555"/>
-            </a:solidFill>
-            <a:prstDash val="solid"/>
-          </a:ln>
-        </p:spPr>
-      </p:sp>
-      <p:sp>
-        <p:nvSpPr>
-          <p:cNvPr id="11" name="Text 9"/>
-          <p:cNvSpPr/>
-          <p:nvPr/>
-        </p:nvSpPr>
-        <p:spPr>
-          <a:xfrm>
-            <a:off x="548640" y="2926080"/>
+              <a:rPr lang="en-US" sz="1600" b="1" dirty="0">
+                <a:solidFill>
+                  <a:srgbClr val="FFFFFF"/>
+                </a:solidFill>
+              </a:rPr>
+              <a:t>D</a:t>
+            </a:r>
+            <a:endParaRPr lang="en-US" sz="1600" dirty="0"/>
+          </a:p>
+        </p:txBody>
+      </p:sp>
+      <p:sp>
+        <p:nvSpPr>
+          <p:cNvPr id="31" name="Shape 29"/>
+          <p:cNvSpPr/>
+          <p:nvPr/>
+        </p:nvSpPr>
+        <p:spPr>
+          <a:xfrm>
+            <a:off x="6446520" y="3689650"/>
+            <a:ext cx="274320" cy="118781"/>
+          </a:xfrm>
+          <a:prstGeom prst="rect">
+            <a:avLst/>
+          </a:prstGeom>
+          <a:solidFill>
+            <a:srgbClr val="FF9999"/>
+          </a:solidFill>
+          <a:ln w="12700">
+            <a:solidFill>
+              <a:srgbClr val="000000"/>
+            </a:solidFill>
+            <a:prstDash val="solid"/>
+          </a:ln>
+        </p:spPr>
+      </p:sp>
+      <p:sp>
+        <p:nvSpPr>
+          <p:cNvPr id="32" name="Shape 30"/>
+          <p:cNvSpPr/>
+          <p:nvPr/>
+        </p:nvSpPr>
+        <p:spPr>
+          <a:xfrm flipV="1">
+            <a:off x="6446520" y="3630259"/>
+            <a:ext cx="274320" cy="59390"/>
+          </a:xfrm>
+          <a:prstGeom prst="triangle">
+            <a:avLst/>
+          </a:prstGeom>
+          <a:solidFill>
+            <a:srgbClr val="FF9999"/>
+          </a:solidFill>
+          <a:ln w="12700">
+            <a:solidFill>
+              <a:srgbClr val="333333"/>
+            </a:solidFill>
+            <a:prstDash val="solid"/>
+          </a:ln>
+        </p:spPr>
+      </p:sp>
+      <p:sp>
+        <p:nvSpPr>
+          <p:cNvPr id="33" name="Shape 31"/>
+          <p:cNvSpPr/>
+          <p:nvPr/>
+        </p:nvSpPr>
+        <p:spPr>
+          <a:xfrm>
+            <a:off x="6446520" y="3808430"/>
+            <a:ext cx="274320" cy="59390"/>
+          </a:xfrm>
+          <a:prstGeom prst="triangle">
+            <a:avLst/>
+          </a:prstGeom>
+          <a:solidFill>
+            <a:srgbClr val="FF9999"/>
+          </a:solidFill>
+          <a:ln w="12700">
+            <a:solidFill>
+              <a:srgbClr val="333333"/>
+            </a:solidFill>
+            <a:prstDash val="solid"/>
+          </a:ln>
+        </p:spPr>
+      </p:sp>
+      <p:sp>
+        <p:nvSpPr>
+          <p:cNvPr id="34" name="Shape 32"/>
+          <p:cNvSpPr/>
+          <p:nvPr/>
+        </p:nvSpPr>
+        <p:spPr>
+          <a:xfrm>
+            <a:off x="6446520" y="4069080"/>
             <a:ext cx="274320" cy="274320"/>
           </a:xfrm>
-          <a:prstGeom prst="rect">
+          <a:prstGeom prst="triangle">
             <a:avLst/>
           </a:prstGeom>
           <a:solidFill>
             <a:srgbClr val="FF9999"/>
           </a:solidFill>
-          <a:ln/>
-        </p:spPr>
-        <p:txBody>
-          <a:bodyPr wrap="square" rtlCol="0" anchor="ctr"/>
-          <a:lstStyle/>
-          <a:p>
-            <a:pPr algn="ctr" indent="0" marL="0">
-              <a:buNone/>
-            </a:pPr>
-            <a:r>
-              <a:rPr lang="en-US" sz="1600" b="1" dirty="0">
-                <a:solidFill>
-                  <a:srgbClr val="FFFFFF"/>
-                </a:solidFill>
-              </a:rPr>
-              <a:t>C</a:t>
-            </a:r>
-            <a:endParaRPr lang="en-US" sz="1600" dirty="0"/>
-          </a:p>
-        </p:txBody>
-      </p:sp>
-      <p:sp>
-        <p:nvSpPr>
-          <p:cNvPr id="12" name="Text 10"/>
-          <p:cNvSpPr/>
-          <p:nvPr/>
-        </p:nvSpPr>
-        <p:spPr>
-          <a:xfrm>
-            <a:off x="914400" y="3200400"/>
-            <a:ext cx="3200400" cy="457200"/>
-          </a:xfrm>
-          <a:prstGeom prst="rect">
-            <a:avLst/>
-          </a:prstGeom>
-          <a:noFill/>
-          <a:ln/>
-        </p:spPr>
-        <p:txBody>
-          <a:bodyPr wrap="square" rtlCol="0" anchor="ctr"/>
-          <a:lstStyle/>
-          <a:p>
-            <a:pPr algn="ctr" indent="0" marL="0">
-              <a:buNone/>
-            </a:pPr>
-            <a:r>
-              <a:rPr lang="en-US" sz="1200" dirty="0">
-                <a:solidFill>
-                  <a:srgbClr val="E0E0E0"/>
-                </a:solidFill>
-              </a:rPr>
-              <a:t>Transformation 3</a:t>
-            </a:r>
-            <a:endParaRPr lang="en-US" sz="1200" dirty="0"/>
-          </a:p>
-        </p:txBody>
-      </p:sp>
-      <p:sp>
-        <p:nvSpPr>
-          <p:cNvPr id="13" name="Shape 11"/>
-          <p:cNvSpPr/>
-          <p:nvPr/>
-        </p:nvSpPr>
-        <p:spPr>
-          <a:xfrm>
-            <a:off x="4754880" y="2834640"/>
-            <a:ext cx="3840480" cy="1005840"/>
-          </a:xfrm>
-          <a:prstGeom prst="rect">
-            <a:avLst/>
-          </a:prstGeom>
-          <a:solidFill>
-            <a:srgbClr val="2A2A2A"/>
-          </a:solidFill>
-          <a:ln w="12700">
-            <a:solidFill>
-              <a:srgbClr val="555555"/>
-            </a:solidFill>
-            <a:prstDash val="solid"/>
-          </a:ln>
-        </p:spPr>
-      </p:sp>
-      <p:sp>
-        <p:nvSpPr>
-          <p:cNvPr id="14" name="Text 12"/>
-          <p:cNvSpPr/>
-          <p:nvPr/>
-        </p:nvSpPr>
-        <p:spPr>
-          <a:xfrm>
-            <a:off x="4846320" y="2926080"/>
-            <a:ext cx="274320" cy="274320"/>
-          </a:xfrm>
-          <a:prstGeom prst="rect">
-            <a:avLst/>
-          </a:prstGeom>
-          <a:solidFill>
-            <a:srgbClr val="FF9999"/>
-          </a:solidFill>
-          <a:ln/>
-        </p:spPr>
-        <p:txBody>
-          <a:bodyPr wrap="square" rtlCol="0" anchor="ctr"/>
-          <a:lstStyle/>
-          <a:p>
-            <a:pPr algn="ctr" indent="0" marL="0">
-              <a:buNone/>
-            </a:pPr>
-            <a:r>
-              <a:rPr lang="en-US" sz="1600" b="1" dirty="0">
-                <a:solidFill>
-                  <a:srgbClr val="FFFFFF"/>
-                </a:solidFill>
-              </a:rPr>
-              <a:t>D</a:t>
-            </a:r>
-            <a:endParaRPr lang="en-US" sz="1600" dirty="0"/>
-          </a:p>
-        </p:txBody>
-      </p:sp>
-      <p:sp>
-        <p:nvSpPr>
-          <p:cNvPr id="15" name="Text 13"/>
-          <p:cNvSpPr/>
-          <p:nvPr/>
-        </p:nvSpPr>
-        <p:spPr>
-          <a:xfrm>
-            <a:off x="5212080" y="3200400"/>
-            <a:ext cx="3200400" cy="457200"/>
-          </a:xfrm>
-          <a:prstGeom prst="rect">
-            <a:avLst/>
-          </a:prstGeom>
-          <a:noFill/>
-          <a:ln/>
-        </p:spPr>
-        <p:txBody>
-          <a:bodyPr wrap="square" rtlCol="0" anchor="ctr"/>
-          <a:lstStyle/>
-          <a:p>
-            <a:pPr algn="ctr" indent="0" marL="0">
-              <a:buNone/>
-            </a:pPr>
-            <a:r>
-              <a:rPr lang="en-US" sz="1200" dirty="0">
-                <a:solidFill>
-                  <a:srgbClr val="E0E0E0"/>
-                </a:solidFill>
-              </a:rPr>
-              <a:t>Transformation 4</a:t>
-            </a:r>
-            <a:endParaRPr lang="en-US" sz="1200" dirty="0"/>
-          </a:p>
-        </p:txBody>
-      </p:sp>
-      <p:sp>
-        <p:nvSpPr>
-          <p:cNvPr id="16" name="Shape 14">
+          <a:ln w="12700">
+            <a:solidFill>
+              <a:srgbClr val="000000"/>
+            </a:solidFill>
+            <a:prstDash val="solid"/>
+          </a:ln>
+        </p:spPr>
+      </p:sp>
+      <p:sp>
+        <p:nvSpPr>
+          <p:cNvPr id="35" name="Shape 33">
             <a:hlinkClick r:id="rId1" tooltip="" action="ppaction://hlinksldjump"/>
           </p:cNvPr>
           <p:cNvSpPr/>
@@ -5545,8 +6009,8 @@
         </p:nvSpPr>
         <p:spPr>
           <a:xfrm>
-            <a:off x="457200" y="1645920"/>
-            <a:ext cx="3840480" cy="1005840"/>
+            <a:off x="457200" y="2011680"/>
+            <a:ext cx="3840480" cy="1188720"/>
           </a:xfrm>
           <a:prstGeom prst="rect">
             <a:avLst/>
@@ -5566,7 +6030,7 @@
       </p:sp>
       <p:sp>
         <p:nvSpPr>
-          <p:cNvPr id="17" name="Shape 15">
+          <p:cNvPr id="36" name="Shape 34">
             <a:hlinkClick r:id="rId2" tooltip="" action="ppaction://hlinksldjump"/>
           </p:cNvPr>
           <p:cNvSpPr/>
@@ -5574,8 +6038,8 @@
         </p:nvSpPr>
         <p:spPr>
           <a:xfrm>
-            <a:off x="4754880" y="1645920"/>
-            <a:ext cx="3840480" cy="1005840"/>
+            <a:off x="4754880" y="2011680"/>
+            <a:ext cx="3840480" cy="1188720"/>
           </a:xfrm>
           <a:prstGeom prst="rect">
             <a:avLst/>
@@ -5595,7 +6059,7 @@
       </p:sp>
       <p:sp>
         <p:nvSpPr>
-          <p:cNvPr id="18" name="Shape 16">
+          <p:cNvPr id="37" name="Shape 35">
             <a:hlinkClick r:id="rId3" tooltip="" action="ppaction://hlinksldjump"/>
           </p:cNvPr>
           <p:cNvSpPr/>
@@ -5603,8 +6067,8 @@
         </p:nvSpPr>
         <p:spPr>
           <a:xfrm>
-            <a:off x="457200" y="2834640"/>
-            <a:ext cx="3840480" cy="1005840"/>
+            <a:off x="457200" y="3383280"/>
+            <a:ext cx="3840480" cy="1188720"/>
           </a:xfrm>
           <a:prstGeom prst="rect">
             <a:avLst/>
@@ -5624,7 +6088,7 @@
       </p:sp>
       <p:sp>
         <p:nvSpPr>
-          <p:cNvPr id="19" name="Shape 17">
+          <p:cNvPr id="38" name="Shape 36">
             <a:hlinkClick r:id="rId4" tooltip="" action="ppaction://hlinksldjump"/>
           </p:cNvPr>
           <p:cNvSpPr/>
@@ -5632,8 +6096,8 @@
         </p:nvSpPr>
         <p:spPr>
           <a:xfrm>
-            <a:off x="4754880" y="2834640"/>
-            <a:ext cx="3840480" cy="1005840"/>
+            <a:off x="4754880" y="3383280"/>
+            <a:ext cx="3840480" cy="1188720"/>
           </a:xfrm>
           <a:prstGeom prst="rect">
             <a:avLst/>
@@ -5751,7 +6215,7 @@
                   <a:srgbClr val="66B3FF"/>
                 </a:solidFill>
               </a:rPr>
-              <a:t>How can you make a different shape using the same parts? (Hexagon + Triangle)</a:t>
+              <a:t>How can you make a different shape using the same parts?</a:t>
             </a:r>
             <a:endParaRPr lang="en-US" sz="1800" dirty="0"/>
           </a:p>
@@ -5765,8 +6229,8 @@
         </p:nvSpPr>
         <p:spPr>
           <a:xfrm>
-            <a:off x="4754880" y="1645920"/>
-            <a:ext cx="3840480" cy="1005840"/>
+            <a:off x="4754880" y="2286000"/>
+            <a:ext cx="3840480" cy="1188720"/>
           </a:xfrm>
           <a:prstGeom prst="rect">
             <a:avLst/>
@@ -5790,7 +6254,7 @@
         </p:nvSpPr>
         <p:spPr>
           <a:xfrm>
-            <a:off x="4846320" y="1737360"/>
+            <a:off x="4846320" y="2377440"/>
             <a:ext cx="274320" cy="274320"/>
           </a:xfrm>
           <a:prstGeom prst="rect">
@@ -5822,43 +6286,107 @@
       </p:sp>
       <p:sp>
         <p:nvSpPr>
-          <p:cNvPr id="6" name="Text 4"/>
-          <p:cNvSpPr/>
-          <p:nvPr/>
-        </p:nvSpPr>
-        <p:spPr>
-          <a:xfrm>
-            <a:off x="5212080" y="2011680"/>
-            <a:ext cx="3200400" cy="457200"/>
-          </a:xfrm>
-          <a:prstGeom prst="rect">
-            <a:avLst/>
-          </a:prstGeom>
-          <a:noFill/>
-          <a:ln/>
-        </p:spPr>
-        <p:txBody>
-          <a:bodyPr wrap="square" rtlCol="0" anchor="ctr"/>
-          <a:lstStyle/>
-          <a:p>
-            <a:pPr algn="ctr" indent="0" marL="0">
-              <a:buNone/>
-            </a:pPr>
-            <a:r>
-              <a:rPr lang="en-US" sz="1200" b="1" dirty="0">
-                <a:solidFill>
-                  <a:srgbClr val="2ECC71"/>
-                </a:solidFill>
-              </a:rPr>
-              <a:t>✓ Transformation 2 (Correct)</a:t>
-            </a:r>
-            <a:endParaRPr lang="en-US" sz="1200" dirty="0"/>
-          </a:p>
-        </p:txBody>
+          <p:cNvPr id="6" name="Shape 4"/>
+          <p:cNvSpPr/>
+          <p:nvPr/>
+        </p:nvSpPr>
+        <p:spPr>
+          <a:xfrm>
+            <a:off x="6446520" y="2958130"/>
+            <a:ext cx="274320" cy="118781"/>
+          </a:xfrm>
+          <a:prstGeom prst="rect">
+            <a:avLst/>
+          </a:prstGeom>
+          <a:solidFill>
+            <a:srgbClr val="66B3FF"/>
+          </a:solidFill>
+          <a:ln w="12700">
+            <a:solidFill>
+              <a:srgbClr val="000000"/>
+            </a:solidFill>
+            <a:prstDash val="solid"/>
+          </a:ln>
+        </p:spPr>
       </p:sp>
       <p:sp>
         <p:nvSpPr>
           <p:cNvPr id="7" name="Shape 5"/>
+          <p:cNvSpPr/>
+          <p:nvPr/>
+        </p:nvSpPr>
+        <p:spPr>
+          <a:xfrm flipV="1">
+            <a:off x="6446520" y="2898739"/>
+            <a:ext cx="274320" cy="59390"/>
+          </a:xfrm>
+          <a:prstGeom prst="triangle">
+            <a:avLst/>
+          </a:prstGeom>
+          <a:solidFill>
+            <a:srgbClr val="66B3FF"/>
+          </a:solidFill>
+          <a:ln w="12700">
+            <a:solidFill>
+              <a:srgbClr val="333333"/>
+            </a:solidFill>
+            <a:prstDash val="solid"/>
+          </a:ln>
+        </p:spPr>
+      </p:sp>
+      <p:sp>
+        <p:nvSpPr>
+          <p:cNvPr id="8" name="Shape 6"/>
+          <p:cNvSpPr/>
+          <p:nvPr/>
+        </p:nvSpPr>
+        <p:spPr>
+          <a:xfrm>
+            <a:off x="6446520" y="3076910"/>
+            <a:ext cx="274320" cy="59390"/>
+          </a:xfrm>
+          <a:prstGeom prst="triangle">
+            <a:avLst/>
+          </a:prstGeom>
+          <a:solidFill>
+            <a:srgbClr val="66B3FF"/>
+          </a:solidFill>
+          <a:ln w="12700">
+            <a:solidFill>
+              <a:srgbClr val="333333"/>
+            </a:solidFill>
+            <a:prstDash val="solid"/>
+          </a:ln>
+        </p:spPr>
+      </p:sp>
+      <p:sp>
+        <p:nvSpPr>
+          <p:cNvPr id="9" name="Shape 7"/>
+          <p:cNvSpPr/>
+          <p:nvPr/>
+        </p:nvSpPr>
+        <p:spPr>
+          <a:xfrm flipV="1">
+            <a:off x="6446520" y="2606040"/>
+            <a:ext cx="274320" cy="274320"/>
+          </a:xfrm>
+          <a:prstGeom prst="triangle">
+            <a:avLst/>
+          </a:prstGeom>
+          <a:solidFill>
+            <a:srgbClr val="66B3FF"/>
+          </a:solidFill>
+          <a:ln w="12700">
+            <a:solidFill>
+              <a:srgbClr val="000000"/>
+            </a:solidFill>
+            <a:prstDash val="solid"/>
+          </a:ln>
+        </p:spPr>
+      </p:sp>
+      <p:sp>
+        <p:nvSpPr>
+          <p:cNvPr id="10" name="Shape 8"/>
           <p:cNvSpPr/>
           <p:nvPr/>
         </p:nvSpPr>
@@ -5883,7 +6411,7 @@
       </p:sp>
       <p:sp>
         <p:nvSpPr>
-          <p:cNvPr id="8" name="Text 6">
+          <p:cNvPr id="11" name="Text 9">
             <a:hlinkClick r:id="rId1" tooltip="" action="ppaction://hlinksldjump"/>
           </p:cNvPr>
           <p:cNvSpPr/>
@@ -6026,7 +6554,7 @@
                   <a:srgbClr val="66B3FF"/>
                 </a:solidFill>
               </a:rPr>
-              <a:t>How can you make a different shape using the same parts? (Parallelogram + Square)</a:t>
+              <a:t>How can you make a different shape using the same parts?</a:t>
             </a:r>
             <a:endParaRPr lang="en-US" sz="1800" dirty="0"/>
           </a:p>
@@ -6034,14 +6562,172 @@
       </p:sp>
       <p:sp>
         <p:nvSpPr>
-          <p:cNvPr id="4" name="Shape 2"/>
-          <p:cNvSpPr/>
-          <p:nvPr/>
-        </p:nvSpPr>
-        <p:spPr>
-          <a:xfrm>
-            <a:off x="457200" y="1645920"/>
-            <a:ext cx="3840480" cy="1005840"/>
+          <p:cNvPr id="4" name="Text 2"/>
+          <p:cNvSpPr/>
+          <p:nvPr/>
+        </p:nvSpPr>
+        <p:spPr>
+          <a:xfrm>
+            <a:off x="640080" y="822960"/>
+            <a:ext cx="1828800" cy="274320"/>
+          </a:xfrm>
+          <a:prstGeom prst="rect">
+            <a:avLst/>
+          </a:prstGeom>
+          <a:noFill/>
+          <a:ln/>
+        </p:spPr>
+        <p:txBody>
+          <a:bodyPr wrap="square" rtlCol="0" anchor="ctr"/>
+          <a:lstStyle/>
+          <a:p>
+            <a:pPr indent="0" marL="0">
+              <a:buNone/>
+            </a:pPr>
+            <a:r>
+              <a:rPr lang="en-US" sz="1400" i="1" dirty="0">
+                <a:solidFill>
+                  <a:srgbClr val="E0E0E0"/>
+                </a:solidFill>
+              </a:rPr>
+              <a:t>Given shapes:</a:t>
+            </a:r>
+            <a:endParaRPr lang="en-US" sz="1400" dirty="0"/>
+          </a:p>
+        </p:txBody>
+      </p:sp>
+      <p:sp>
+        <p:nvSpPr>
+          <p:cNvPr id="5" name="Shape 3"/>
+          <p:cNvSpPr/>
+          <p:nvPr/>
+        </p:nvSpPr>
+        <p:spPr>
+          <a:xfrm rot="1233363">
+            <a:off x="1005840" y="1097280"/>
+            <a:ext cx="548640" cy="365760"/>
+          </a:xfrm>
+          <a:prstGeom prst="rect">
+            <a:avLst/>
+          </a:prstGeom>
+          <a:solidFill>
+            <a:srgbClr val="66B3FF"/>
+          </a:solidFill>
+          <a:ln w="12700">
+            <a:solidFill>
+              <a:srgbClr val="000000"/>
+            </a:solidFill>
+            <a:prstDash val="solid"/>
+          </a:ln>
+        </p:spPr>
+      </p:sp>
+      <p:sp>
+        <p:nvSpPr>
+          <p:cNvPr id="6" name="Text 4"/>
+          <p:cNvSpPr/>
+          <p:nvPr/>
+        </p:nvSpPr>
+        <p:spPr>
+          <a:xfrm>
+            <a:off x="1005840" y="1508760"/>
+            <a:ext cx="548640" cy="182880"/>
+          </a:xfrm>
+          <a:prstGeom prst="rect">
+            <a:avLst/>
+          </a:prstGeom>
+          <a:noFill/>
+          <a:ln/>
+        </p:spPr>
+        <p:txBody>
+          <a:bodyPr wrap="square" rtlCol="0" anchor="ctr"/>
+          <a:lstStyle/>
+          <a:p>
+            <a:pPr algn="ctr" indent="0" marL="0">
+              <a:buNone/>
+            </a:pPr>
+            <a:r>
+              <a:rPr lang="en-US" sz="1000" dirty="0">
+                <a:solidFill>
+                  <a:srgbClr val="E0E0E0"/>
+                </a:solidFill>
+              </a:rPr>
+              <a:t>Parallelogram</a:t>
+            </a:r>
+            <a:endParaRPr lang="en-US" sz="1000" dirty="0"/>
+          </a:p>
+        </p:txBody>
+      </p:sp>
+      <p:sp>
+        <p:nvSpPr>
+          <p:cNvPr id="7" name="Shape 5"/>
+          <p:cNvSpPr/>
+          <p:nvPr/>
+        </p:nvSpPr>
+        <p:spPr>
+          <a:xfrm>
+            <a:off x="2011680" y="1097280"/>
+            <a:ext cx="365760" cy="365760"/>
+          </a:xfrm>
+          <a:prstGeom prst="rect">
+            <a:avLst/>
+          </a:prstGeom>
+          <a:solidFill>
+            <a:srgbClr val="66B3FF"/>
+          </a:solidFill>
+          <a:ln w="12700">
+            <a:solidFill>
+              <a:srgbClr val="000000"/>
+            </a:solidFill>
+            <a:prstDash val="solid"/>
+          </a:ln>
+        </p:spPr>
+      </p:sp>
+      <p:sp>
+        <p:nvSpPr>
+          <p:cNvPr id="8" name="Text 6"/>
+          <p:cNvSpPr/>
+          <p:nvPr/>
+        </p:nvSpPr>
+        <p:spPr>
+          <a:xfrm>
+            <a:off x="2011680" y="1508760"/>
+            <a:ext cx="365760" cy="182880"/>
+          </a:xfrm>
+          <a:prstGeom prst="rect">
+            <a:avLst/>
+          </a:prstGeom>
+          <a:noFill/>
+          <a:ln/>
+        </p:spPr>
+        <p:txBody>
+          <a:bodyPr wrap="square" rtlCol="0" anchor="ctr"/>
+          <a:lstStyle/>
+          <a:p>
+            <a:pPr algn="ctr" indent="0" marL="0">
+              <a:buNone/>
+            </a:pPr>
+            <a:r>
+              <a:rPr lang="en-US" sz="1000" dirty="0">
+                <a:solidFill>
+                  <a:srgbClr val="E0E0E0"/>
+                </a:solidFill>
+              </a:rPr>
+              <a:t>Square</a:t>
+            </a:r>
+            <a:endParaRPr lang="en-US" sz="1000" dirty="0"/>
+          </a:p>
+        </p:txBody>
+      </p:sp>
+      <p:sp>
+        <p:nvSpPr>
+          <p:cNvPr id="9" name="Shape 7"/>
+          <p:cNvSpPr/>
+          <p:nvPr/>
+        </p:nvSpPr>
+        <p:spPr>
+          <a:xfrm>
+            <a:off x="457200" y="2011680"/>
+            <a:ext cx="3840480" cy="1188720"/>
           </a:xfrm>
           <a:prstGeom prst="rect">
             <a:avLst/>
@@ -6059,13 +6745,13 @@
       </p:sp>
       <p:sp>
         <p:nvSpPr>
-          <p:cNvPr id="5" name="Text 3"/>
-          <p:cNvSpPr/>
-          <p:nvPr/>
-        </p:nvSpPr>
-        <p:spPr>
-          <a:xfrm>
-            <a:off x="548640" y="1737360"/>
+          <p:cNvPr id="10" name="Text 8"/>
+          <p:cNvSpPr/>
+          <p:nvPr/>
+        </p:nvSpPr>
+        <p:spPr>
+          <a:xfrm>
+            <a:off x="548640" y="2103120"/>
             <a:ext cx="274320" cy="274320"/>
           </a:xfrm>
           <a:prstGeom prst="rect">
@@ -6097,19 +6783,96 @@
       </p:sp>
       <p:sp>
         <p:nvSpPr>
-          <p:cNvPr id="6" name="Text 4"/>
-          <p:cNvSpPr/>
-          <p:nvPr/>
-        </p:nvSpPr>
-        <p:spPr>
-          <a:xfrm>
-            <a:off x="914400" y="2011680"/>
-            <a:ext cx="3200400" cy="457200"/>
-          </a:xfrm>
-          <a:prstGeom prst="rect">
-            <a:avLst/>
-          </a:prstGeom>
-          <a:noFill/>
+          <p:cNvPr id="11" name="Shape 9"/>
+          <p:cNvSpPr/>
+          <p:nvPr/>
+        </p:nvSpPr>
+        <p:spPr>
+          <a:xfrm rot="1233363">
+            <a:off x="1371600" y="2468880"/>
+            <a:ext cx="548640" cy="365760"/>
+          </a:xfrm>
+          <a:prstGeom prst="rect">
+            <a:avLst/>
+          </a:prstGeom>
+          <a:solidFill>
+            <a:srgbClr val="FF9999"/>
+          </a:solidFill>
+          <a:ln w="12700">
+            <a:solidFill>
+              <a:srgbClr val="000000"/>
+            </a:solidFill>
+            <a:prstDash val="solid"/>
+          </a:ln>
+        </p:spPr>
+      </p:sp>
+      <p:sp>
+        <p:nvSpPr>
+          <p:cNvPr id="12" name="Shape 10"/>
+          <p:cNvSpPr/>
+          <p:nvPr/>
+        </p:nvSpPr>
+        <p:spPr>
+          <a:xfrm>
+            <a:off x="2011680" y="2468880"/>
+            <a:ext cx="365760" cy="365760"/>
+          </a:xfrm>
+          <a:prstGeom prst="rect">
+            <a:avLst/>
+          </a:prstGeom>
+          <a:solidFill>
+            <a:srgbClr val="FF9999"/>
+          </a:solidFill>
+          <a:ln w="12700">
+            <a:solidFill>
+              <a:srgbClr val="000000"/>
+            </a:solidFill>
+            <a:prstDash val="solid"/>
+          </a:ln>
+        </p:spPr>
+      </p:sp>
+      <p:sp>
+        <p:nvSpPr>
+          <p:cNvPr id="13" name="Shape 11"/>
+          <p:cNvSpPr/>
+          <p:nvPr/>
+        </p:nvSpPr>
+        <p:spPr>
+          <a:xfrm>
+            <a:off x="4754880" y="2011680"/>
+            <a:ext cx="3840480" cy="1188720"/>
+          </a:xfrm>
+          <a:prstGeom prst="rect">
+            <a:avLst/>
+          </a:prstGeom>
+          <a:solidFill>
+            <a:srgbClr val="2A2A2A"/>
+          </a:solidFill>
+          <a:ln w="12700">
+            <a:solidFill>
+              <a:srgbClr val="555555"/>
+            </a:solidFill>
+            <a:prstDash val="solid"/>
+          </a:ln>
+        </p:spPr>
+      </p:sp>
+      <p:sp>
+        <p:nvSpPr>
+          <p:cNvPr id="14" name="Text 12"/>
+          <p:cNvSpPr/>
+          <p:nvPr/>
+        </p:nvSpPr>
+        <p:spPr>
+          <a:xfrm>
+            <a:off x="4846320" y="2103120"/>
+            <a:ext cx="274320" cy="274320"/>
+          </a:xfrm>
+          <a:prstGeom prst="rect">
+            <a:avLst/>
+          </a:prstGeom>
+          <a:solidFill>
+            <a:srgbClr val="FF9999"/>
+          </a:solidFill>
           <a:ln/>
         </p:spPr>
         <p:txBody>
@@ -6120,27 +6883,77 @@
               <a:buNone/>
             </a:pPr>
             <a:r>
-              <a:rPr lang="en-US" sz="1200" dirty="0">
-                <a:solidFill>
-                  <a:srgbClr val="E0E0E0"/>
-                </a:solidFill>
-              </a:rPr>
-              <a:t>Transformation 1</a:t>
-            </a:r>
-            <a:endParaRPr lang="en-US" sz="1200" dirty="0"/>
-          </a:p>
-        </p:txBody>
-      </p:sp>
-      <p:sp>
-        <p:nvSpPr>
-          <p:cNvPr id="7" name="Shape 5"/>
-          <p:cNvSpPr/>
-          <p:nvPr/>
-        </p:nvSpPr>
-        <p:spPr>
-          <a:xfrm>
-            <a:off x="4754880" y="1645920"/>
-            <a:ext cx="3840480" cy="1005840"/>
+              <a:rPr lang="en-US" sz="1600" b="1" dirty="0">
+                <a:solidFill>
+                  <a:srgbClr val="FFFFFF"/>
+                </a:solidFill>
+              </a:rPr>
+              <a:t>B</a:t>
+            </a:r>
+            <a:endParaRPr lang="en-US" sz="1600" dirty="0"/>
+          </a:p>
+        </p:txBody>
+      </p:sp>
+      <p:sp>
+        <p:nvSpPr>
+          <p:cNvPr id="15" name="Shape 13"/>
+          <p:cNvSpPr/>
+          <p:nvPr/>
+        </p:nvSpPr>
+        <p:spPr>
+          <a:xfrm>
+            <a:off x="5943600" y="2468880"/>
+            <a:ext cx="365760" cy="365760"/>
+          </a:xfrm>
+          <a:prstGeom prst="rect">
+            <a:avLst/>
+          </a:prstGeom>
+          <a:solidFill>
+            <a:srgbClr val="FF9999"/>
+          </a:solidFill>
+          <a:ln w="12700">
+            <a:solidFill>
+              <a:srgbClr val="000000"/>
+            </a:solidFill>
+            <a:prstDash val="solid"/>
+          </a:ln>
+        </p:spPr>
+      </p:sp>
+      <p:sp>
+        <p:nvSpPr>
+          <p:cNvPr id="16" name="Shape 14"/>
+          <p:cNvSpPr/>
+          <p:nvPr/>
+        </p:nvSpPr>
+        <p:spPr>
+          <a:xfrm rot="1233363">
+            <a:off x="6400800" y="2468880"/>
+            <a:ext cx="548640" cy="365760"/>
+          </a:xfrm>
+          <a:prstGeom prst="rect">
+            <a:avLst/>
+          </a:prstGeom>
+          <a:solidFill>
+            <a:srgbClr val="FF9999"/>
+          </a:solidFill>
+          <a:ln w="12700">
+            <a:solidFill>
+              <a:srgbClr val="000000"/>
+            </a:solidFill>
+            <a:prstDash val="solid"/>
+          </a:ln>
+        </p:spPr>
+      </p:sp>
+      <p:sp>
+        <p:nvSpPr>
+          <p:cNvPr id="17" name="Shape 15"/>
+          <p:cNvSpPr/>
+          <p:nvPr/>
+        </p:nvSpPr>
+        <p:spPr>
+          <a:xfrm>
+            <a:off x="457200" y="3383280"/>
+            <a:ext cx="3840480" cy="1188720"/>
           </a:xfrm>
           <a:prstGeom prst="rect">
             <a:avLst/>
@@ -6158,19 +6971,132 @@
       </p:sp>
       <p:sp>
         <p:nvSpPr>
-          <p:cNvPr id="8" name="Text 6"/>
-          <p:cNvSpPr/>
-          <p:nvPr/>
-        </p:nvSpPr>
-        <p:spPr>
-          <a:xfrm>
-            <a:off x="4846320" y="1737360"/>
+          <p:cNvPr id="18" name="Text 16"/>
+          <p:cNvSpPr/>
+          <p:nvPr/>
+        </p:nvSpPr>
+        <p:spPr>
+          <a:xfrm>
+            <a:off x="548640" y="3474720"/>
             <a:ext cx="274320" cy="274320"/>
           </a:xfrm>
           <a:prstGeom prst="rect">
             <a:avLst/>
           </a:prstGeom>
           <a:solidFill>
+            <a:srgbClr val="66B3FF"/>
+          </a:solidFill>
+          <a:ln/>
+        </p:spPr>
+        <p:txBody>
+          <a:bodyPr wrap="square" rtlCol="0" anchor="ctr"/>
+          <a:lstStyle/>
+          <a:p>
+            <a:pPr algn="ctr" indent="0" marL="0">
+              <a:buNone/>
+            </a:pPr>
+            <a:r>
+              <a:rPr lang="en-US" sz="1600" b="1" dirty="0">
+                <a:solidFill>
+                  <a:srgbClr val="FFFFFF"/>
+                </a:solidFill>
+              </a:rPr>
+              <a:t>C</a:t>
+            </a:r>
+            <a:endParaRPr lang="en-US" sz="1600" dirty="0"/>
+          </a:p>
+        </p:txBody>
+      </p:sp>
+      <p:sp>
+        <p:nvSpPr>
+          <p:cNvPr id="19" name="Shape 17"/>
+          <p:cNvSpPr/>
+          <p:nvPr/>
+        </p:nvSpPr>
+        <p:spPr>
+          <a:xfrm rot="1233363">
+            <a:off x="1737360" y="3749040"/>
+            <a:ext cx="548640" cy="365760"/>
+          </a:xfrm>
+          <a:prstGeom prst="rect">
+            <a:avLst/>
+          </a:prstGeom>
+          <a:solidFill>
+            <a:srgbClr val="66B3FF"/>
+          </a:solidFill>
+          <a:ln w="12700">
+            <a:solidFill>
+              <a:srgbClr val="000000"/>
+            </a:solidFill>
+            <a:prstDash val="solid"/>
+          </a:ln>
+        </p:spPr>
+      </p:sp>
+      <p:sp>
+        <p:nvSpPr>
+          <p:cNvPr id="20" name="Shape 18"/>
+          <p:cNvSpPr/>
+          <p:nvPr/>
+        </p:nvSpPr>
+        <p:spPr>
+          <a:xfrm>
+            <a:off x="1828800" y="4160520"/>
+            <a:ext cx="365760" cy="365760"/>
+          </a:xfrm>
+          <a:prstGeom prst="rect">
+            <a:avLst/>
+          </a:prstGeom>
+          <a:solidFill>
+            <a:srgbClr val="66B3FF"/>
+          </a:solidFill>
+          <a:ln w="12700">
+            <a:solidFill>
+              <a:srgbClr val="000000"/>
+            </a:solidFill>
+            <a:prstDash val="solid"/>
+          </a:ln>
+        </p:spPr>
+      </p:sp>
+      <p:sp>
+        <p:nvSpPr>
+          <p:cNvPr id="21" name="Shape 19"/>
+          <p:cNvSpPr/>
+          <p:nvPr/>
+        </p:nvSpPr>
+        <p:spPr>
+          <a:xfrm>
+            <a:off x="4754880" y="3383280"/>
+            <a:ext cx="3840480" cy="1188720"/>
+          </a:xfrm>
+          <a:prstGeom prst="rect">
+            <a:avLst/>
+          </a:prstGeom>
+          <a:solidFill>
+            <a:srgbClr val="2A2A2A"/>
+          </a:solidFill>
+          <a:ln w="12700">
+            <a:solidFill>
+              <a:srgbClr val="555555"/>
+            </a:solidFill>
+            <a:prstDash val="solid"/>
+          </a:ln>
+        </p:spPr>
+      </p:sp>
+      <p:sp>
+        <p:nvSpPr>
+          <p:cNvPr id="22" name="Text 20"/>
+          <p:cNvSpPr/>
+          <p:nvPr/>
+        </p:nvSpPr>
+        <p:spPr>
+          <a:xfrm>
+            <a:off x="4846320" y="3474720"/>
+            <a:ext cx="274320" cy="274320"/>
+          </a:xfrm>
+          <a:prstGeom prst="rect">
+            <a:avLst/>
+          </a:prstGeom>
+          <a:solidFill>
             <a:srgbClr val="FF9999"/>
           </a:solidFill>
           <a:ln/>
@@ -6188,7 +7114,7 @@
                   <a:srgbClr val="FFFFFF"/>
                 </a:solidFill>
               </a:rPr>
-              <a:t>B</a:t>
+              <a:t>D</a:t>
             </a:r>
             <a:endParaRPr lang="en-US" sz="1600" dirty="0"/>
           </a:p>
@@ -6196,174 +7122,14 @@
       </p:sp>
       <p:sp>
         <p:nvSpPr>
-          <p:cNvPr id="9" name="Text 7"/>
-          <p:cNvSpPr/>
-          <p:nvPr/>
-        </p:nvSpPr>
-        <p:spPr>
-          <a:xfrm>
-            <a:off x="5212080" y="2011680"/>
-            <a:ext cx="3200400" cy="457200"/>
-          </a:xfrm>
-          <a:prstGeom prst="rect">
-            <a:avLst/>
-          </a:prstGeom>
-          <a:noFill/>
-          <a:ln/>
-        </p:spPr>
-        <p:txBody>
-          <a:bodyPr wrap="square" rtlCol="0" anchor="ctr"/>
-          <a:lstStyle/>
-          <a:p>
-            <a:pPr algn="ctr" indent="0" marL="0">
-              <a:buNone/>
-            </a:pPr>
-            <a:r>
-              <a:rPr lang="en-US" sz="1200" dirty="0">
-                <a:solidFill>
-                  <a:srgbClr val="E0E0E0"/>
-                </a:solidFill>
-              </a:rPr>
-              <a:t>Transformation 2</a:t>
-            </a:r>
-            <a:endParaRPr lang="en-US" sz="1200" dirty="0"/>
-          </a:p>
-        </p:txBody>
-      </p:sp>
-      <p:sp>
-        <p:nvSpPr>
-          <p:cNvPr id="10" name="Shape 8"/>
-          <p:cNvSpPr/>
-          <p:nvPr/>
-        </p:nvSpPr>
-        <p:spPr>
-          <a:xfrm>
-            <a:off x="457200" y="2834640"/>
-            <a:ext cx="3840480" cy="1005840"/>
-          </a:xfrm>
-          <a:prstGeom prst="rect">
-            <a:avLst/>
-          </a:prstGeom>
-          <a:solidFill>
-            <a:srgbClr val="2A2A2A"/>
-          </a:solidFill>
-          <a:ln w="12700">
-            <a:solidFill>
-              <a:srgbClr val="555555"/>
-            </a:solidFill>
-            <a:prstDash val="solid"/>
-          </a:ln>
-        </p:spPr>
-      </p:sp>
-      <p:sp>
-        <p:nvSpPr>
-          <p:cNvPr id="11" name="Text 9"/>
-          <p:cNvSpPr/>
-          <p:nvPr/>
-        </p:nvSpPr>
-        <p:spPr>
-          <a:xfrm>
-            <a:off x="548640" y="2926080"/>
-            <a:ext cx="274320" cy="274320"/>
-          </a:xfrm>
-          <a:prstGeom prst="rect">
-            <a:avLst/>
-          </a:prstGeom>
-          <a:solidFill>
-            <a:srgbClr val="66B3FF"/>
-          </a:solidFill>
-          <a:ln/>
-        </p:spPr>
-        <p:txBody>
-          <a:bodyPr wrap="square" rtlCol="0" anchor="ctr"/>
-          <a:lstStyle/>
-          <a:p>
-            <a:pPr algn="ctr" indent="0" marL="0">
-              <a:buNone/>
-            </a:pPr>
-            <a:r>
-              <a:rPr lang="en-US" sz="1600" b="1" dirty="0">
-                <a:solidFill>
-                  <a:srgbClr val="FFFFFF"/>
-                </a:solidFill>
-              </a:rPr>
-              <a:t>C</a:t>
-            </a:r>
-            <a:endParaRPr lang="en-US" sz="1600" dirty="0"/>
-          </a:p>
-        </p:txBody>
-      </p:sp>
-      <p:sp>
-        <p:nvSpPr>
-          <p:cNvPr id="12" name="Text 10"/>
-          <p:cNvSpPr/>
-          <p:nvPr/>
-        </p:nvSpPr>
-        <p:spPr>
-          <a:xfrm>
-            <a:off x="914400" y="3200400"/>
-            <a:ext cx="3200400" cy="457200"/>
-          </a:xfrm>
-          <a:prstGeom prst="rect">
-            <a:avLst/>
-          </a:prstGeom>
-          <a:noFill/>
-          <a:ln/>
-        </p:spPr>
-        <p:txBody>
-          <a:bodyPr wrap="square" rtlCol="0" anchor="ctr"/>
-          <a:lstStyle/>
-          <a:p>
-            <a:pPr algn="ctr" indent="0" marL="0">
-              <a:buNone/>
-            </a:pPr>
-            <a:r>
-              <a:rPr lang="en-US" sz="1200" dirty="0">
-                <a:solidFill>
-                  <a:srgbClr val="E0E0E0"/>
-                </a:solidFill>
-              </a:rPr>
-              <a:t>Transformation 3 (Correct)</a:t>
-            </a:r>
-            <a:endParaRPr lang="en-US" sz="1200" dirty="0"/>
-          </a:p>
-        </p:txBody>
-      </p:sp>
-      <p:sp>
-        <p:nvSpPr>
-          <p:cNvPr id="13" name="Shape 11"/>
-          <p:cNvSpPr/>
-          <p:nvPr/>
-        </p:nvSpPr>
-        <p:spPr>
-          <a:xfrm>
-            <a:off x="4754880" y="2834640"/>
-            <a:ext cx="3840480" cy="1005840"/>
-          </a:xfrm>
-          <a:prstGeom prst="rect">
-            <a:avLst/>
-          </a:prstGeom>
-          <a:solidFill>
-            <a:srgbClr val="2A2A2A"/>
-          </a:solidFill>
-          <a:ln w="12700">
-            <a:solidFill>
-              <a:srgbClr val="555555"/>
-            </a:solidFill>
-            <a:prstDash val="solid"/>
-          </a:ln>
-        </p:spPr>
-      </p:sp>
-      <p:sp>
-        <p:nvSpPr>
-          <p:cNvPr id="14" name="Text 12"/>
-          <p:cNvSpPr/>
-          <p:nvPr/>
-        </p:nvSpPr>
-        <p:spPr>
-          <a:xfrm>
-            <a:off x="4846320" y="2926080"/>
-            <a:ext cx="274320" cy="274320"/>
+          <p:cNvPr id="23" name="Shape 21"/>
+          <p:cNvSpPr/>
+          <p:nvPr/>
+        </p:nvSpPr>
+        <p:spPr>
+          <a:xfrm>
+            <a:off x="6400800" y="3749040"/>
+            <a:ext cx="365760" cy="365760"/>
           </a:xfrm>
           <a:prstGeom prst="rect">
             <a:avLst/>
@@ -6371,66 +7137,42 @@
           <a:solidFill>
             <a:srgbClr val="FF9999"/>
           </a:solidFill>
-          <a:ln/>
-        </p:spPr>
-        <p:txBody>
-          <a:bodyPr wrap="square" rtlCol="0" anchor="ctr"/>
-          <a:lstStyle/>
-          <a:p>
-            <a:pPr algn="ctr" indent="0" marL="0">
-              <a:buNone/>
-            </a:pPr>
-            <a:r>
-              <a:rPr lang="en-US" sz="1600" b="1" dirty="0">
-                <a:solidFill>
-                  <a:srgbClr val="FFFFFF"/>
-                </a:solidFill>
-              </a:rPr>
-              <a:t>D</a:t>
-            </a:r>
-            <a:endParaRPr lang="en-US" sz="1600" dirty="0"/>
-          </a:p>
-        </p:txBody>
-      </p:sp>
-      <p:sp>
-        <p:nvSpPr>
-          <p:cNvPr id="15" name="Text 13"/>
-          <p:cNvSpPr/>
-          <p:nvPr/>
-        </p:nvSpPr>
-        <p:spPr>
-          <a:xfrm>
-            <a:off x="5212080" y="3200400"/>
-            <a:ext cx="3200400" cy="457200"/>
-          </a:xfrm>
-          <a:prstGeom prst="rect">
-            <a:avLst/>
-          </a:prstGeom>
-          <a:noFill/>
-          <a:ln/>
-        </p:spPr>
-        <p:txBody>
-          <a:bodyPr wrap="square" rtlCol="0" anchor="ctr"/>
-          <a:lstStyle/>
-          <a:p>
-            <a:pPr algn="ctr" indent="0" marL="0">
-              <a:buNone/>
-            </a:pPr>
-            <a:r>
-              <a:rPr lang="en-US" sz="1200" dirty="0">
-                <a:solidFill>
-                  <a:srgbClr val="E0E0E0"/>
-                </a:solidFill>
-              </a:rPr>
-              <a:t>Transformation 4</a:t>
-            </a:r>
-            <a:endParaRPr lang="en-US" sz="1200" dirty="0"/>
-          </a:p>
-        </p:txBody>
-      </p:sp>
-      <p:sp>
-        <p:nvSpPr>
-          <p:cNvPr id="16" name="Shape 14">
+          <a:ln w="12700">
+            <a:solidFill>
+              <a:srgbClr val="000000"/>
+            </a:solidFill>
+            <a:prstDash val="solid"/>
+          </a:ln>
+        </p:spPr>
+      </p:sp>
+      <p:sp>
+        <p:nvSpPr>
+          <p:cNvPr id="24" name="Shape 22"/>
+          <p:cNvSpPr/>
+          <p:nvPr/>
+        </p:nvSpPr>
+        <p:spPr>
+          <a:xfrm rot="1233363">
+            <a:off x="6400800" y="4160520"/>
+            <a:ext cx="548640" cy="365760"/>
+          </a:xfrm>
+          <a:prstGeom prst="rect">
+            <a:avLst/>
+          </a:prstGeom>
+          <a:solidFill>
+            <a:srgbClr val="FF9999"/>
+          </a:solidFill>
+          <a:ln w="12700">
+            <a:solidFill>
+              <a:srgbClr val="000000"/>
+            </a:solidFill>
+            <a:prstDash val="solid"/>
+          </a:ln>
+        </p:spPr>
+      </p:sp>
+      <p:sp>
+        <p:nvSpPr>
+          <p:cNvPr id="25" name="Shape 23">
             <a:hlinkClick r:id="rId1" tooltip="" action="ppaction://hlinksldjump"/>
           </p:cNvPr>
           <p:cNvSpPr/>
@@ -6438,8 +7180,8 @@
         </p:nvSpPr>
         <p:spPr>
           <a:xfrm>
-            <a:off x="457200" y="1645920"/>
-            <a:ext cx="3840480" cy="1005840"/>
+            <a:off x="457200" y="2011680"/>
+            <a:ext cx="3840480" cy="1188720"/>
           </a:xfrm>
           <a:prstGeom prst="rect">
             <a:avLst/>
@@ -6459,7 +7201,7 @@
       </p:sp>
       <p:sp>
         <p:nvSpPr>
-          <p:cNvPr id="17" name="Shape 15">
+          <p:cNvPr id="26" name="Shape 24">
             <a:hlinkClick r:id="rId2" tooltip="" action="ppaction://hlinksldjump"/>
           </p:cNvPr>
           <p:cNvSpPr/>
@@ -6467,8 +7209,8 @@
         </p:nvSpPr>
         <p:spPr>
           <a:xfrm>
-            <a:off x="4754880" y="1645920"/>
-            <a:ext cx="3840480" cy="1005840"/>
+            <a:off x="4754880" y="2011680"/>
+            <a:ext cx="3840480" cy="1188720"/>
           </a:xfrm>
           <a:prstGeom prst="rect">
             <a:avLst/>
@@ -6488,7 +7230,7 @@
       </p:sp>
       <p:sp>
         <p:nvSpPr>
-          <p:cNvPr id="18" name="Shape 16">
+          <p:cNvPr id="27" name="Shape 25">
             <a:hlinkClick r:id="rId3" tooltip="" action="ppaction://hlinksldjump"/>
           </p:cNvPr>
           <p:cNvSpPr/>
@@ -6496,8 +7238,8 @@
         </p:nvSpPr>
         <p:spPr>
           <a:xfrm>
-            <a:off x="457200" y="2834640"/>
-            <a:ext cx="3840480" cy="1005840"/>
+            <a:off x="457200" y="3383280"/>
+            <a:ext cx="3840480" cy="1188720"/>
           </a:xfrm>
           <a:prstGeom prst="rect">
             <a:avLst/>
@@ -6517,7 +7259,7 @@
       </p:sp>
       <p:sp>
         <p:nvSpPr>
-          <p:cNvPr id="19" name="Shape 17">
+          <p:cNvPr id="28" name="Shape 26">
             <a:hlinkClick r:id="rId4" tooltip="" action="ppaction://hlinksldjump"/>
           </p:cNvPr>
           <p:cNvSpPr/>
@@ -6525,8 +7267,8 @@
         </p:nvSpPr>
         <p:spPr>
           <a:xfrm>
-            <a:off x="4754880" y="2834640"/>
-            <a:ext cx="3840480" cy="1005840"/>
+            <a:off x="4754880" y="3383280"/>
+            <a:ext cx="3840480" cy="1188720"/>
           </a:xfrm>
           <a:prstGeom prst="rect">
             <a:avLst/>
@@ -6644,7 +7386,7 @@
                   <a:srgbClr val="66B3FF"/>
                 </a:solidFill>
               </a:rPr>
-              <a:t>How can you make a different shape using the same parts? (Parallelogram + Square)</a:t>
+              <a:t>How can you make a different shape using the same parts?</a:t>
             </a:r>
             <a:endParaRPr lang="en-US" sz="1800" dirty="0"/>
           </a:p>
@@ -6658,8 +7400,8 @@
         </p:nvSpPr>
         <p:spPr>
           <a:xfrm>
-            <a:off x="457200" y="2834640"/>
-            <a:ext cx="3840480" cy="1005840"/>
+            <a:off x="457200" y="2286000"/>
+            <a:ext cx="3840480" cy="1188720"/>
           </a:xfrm>
           <a:prstGeom prst="rect">
             <a:avLst/>
@@ -6683,7 +7425,7 @@
         </p:nvSpPr>
         <p:spPr>
           <a:xfrm>
-            <a:off x="548640" y="2926080"/>
+            <a:off x="548640" y="2377440"/>
             <a:ext cx="274320" cy="274320"/>
           </a:xfrm>
           <a:prstGeom prst="rect">
@@ -6715,43 +7457,57 @@
       </p:sp>
       <p:sp>
         <p:nvSpPr>
-          <p:cNvPr id="6" name="Text 4"/>
-          <p:cNvSpPr/>
-          <p:nvPr/>
-        </p:nvSpPr>
-        <p:spPr>
-          <a:xfrm>
-            <a:off x="914400" y="3200400"/>
-            <a:ext cx="3200400" cy="457200"/>
-          </a:xfrm>
-          <a:prstGeom prst="rect">
-            <a:avLst/>
-          </a:prstGeom>
-          <a:noFill/>
-          <a:ln/>
-        </p:spPr>
-        <p:txBody>
-          <a:bodyPr wrap="square" rtlCol="0" anchor="ctr"/>
-          <a:lstStyle/>
-          <a:p>
-            <a:pPr algn="ctr" indent="0" marL="0">
-              <a:buNone/>
-            </a:pPr>
-            <a:r>
-              <a:rPr lang="en-US" sz="1200" b="1" dirty="0">
-                <a:solidFill>
-                  <a:srgbClr val="2ECC71"/>
-                </a:solidFill>
-              </a:rPr>
-              <a:t>✓ Transformation 3 (Correct)</a:t>
-            </a:r>
-            <a:endParaRPr lang="en-US" sz="1200" dirty="0"/>
-          </a:p>
-        </p:txBody>
+          <p:cNvPr id="6" name="Shape 4"/>
+          <p:cNvSpPr/>
+          <p:nvPr/>
+        </p:nvSpPr>
+        <p:spPr>
+          <a:xfrm rot="1233363">
+            <a:off x="1737360" y="2651760"/>
+            <a:ext cx="548640" cy="365760"/>
+          </a:xfrm>
+          <a:prstGeom prst="rect">
+            <a:avLst/>
+          </a:prstGeom>
+          <a:solidFill>
+            <a:srgbClr val="66B3FF"/>
+          </a:solidFill>
+          <a:ln w="12700">
+            <a:solidFill>
+              <a:srgbClr val="000000"/>
+            </a:solidFill>
+            <a:prstDash val="solid"/>
+          </a:ln>
+        </p:spPr>
       </p:sp>
       <p:sp>
         <p:nvSpPr>
           <p:cNvPr id="7" name="Shape 5"/>
+          <p:cNvSpPr/>
+          <p:nvPr/>
+        </p:nvSpPr>
+        <p:spPr>
+          <a:xfrm>
+            <a:off x="1828800" y="3063240"/>
+            <a:ext cx="365760" cy="365760"/>
+          </a:xfrm>
+          <a:prstGeom prst="rect">
+            <a:avLst/>
+          </a:prstGeom>
+          <a:solidFill>
+            <a:srgbClr val="66B3FF"/>
+          </a:solidFill>
+          <a:ln w="12700">
+            <a:solidFill>
+              <a:srgbClr val="000000"/>
+            </a:solidFill>
+            <a:prstDash val="solid"/>
+          </a:ln>
+        </p:spPr>
+      </p:sp>
+      <p:sp>
+        <p:nvSpPr>
+          <p:cNvPr id="8" name="Shape 6"/>
           <p:cNvSpPr/>
           <p:nvPr/>
         </p:nvSpPr>
@@ -6776,7 +7532,7 @@
       </p:sp>
       <p:sp>
         <p:nvSpPr>
-          <p:cNvPr id="8" name="Text 6">
+          <p:cNvPr id="9" name="Text 7">
             <a:hlinkClick r:id="rId1" tooltip="" action="ppaction://hlinksldjump"/>
           </p:cNvPr>
           <p:cNvSpPr/>

</xml_diff>

<commit_message>
Implement PNG image embedding for Q6 and Q7 shape combinations
</commit_message>
<xml_diff>
--- a/math-shapes-quiz-complete.pptx
+++ b/math-shapes-quiz-complete.pptx
@@ -5148,7 +5148,7 @@
         <p:spPr>
           <a:xfrm>
             <a:off x="640080" y="822960"/>
-            <a:ext cx="1828800" cy="274320"/>
+            <a:ext cx="3657600" cy="274320"/>
           </a:xfrm>
           <a:prstGeom prst="rect">
             <a:avLst/>
@@ -5169,7 +5169,7 @@
                   <a:srgbClr val="E0E0E0"/>
                 </a:solidFill>
               </a:rPr>
-              <a:t>Given shapes:</a:t>
+              <a:t>Given shapes: Hexagon + Triangle</a:t>
             </a:r>
             <a:endParaRPr lang="en-US" sz="1400" dirty="0"/>
           </a:p>
@@ -5183,8 +5183,120 @@
         </p:nvSpPr>
         <p:spPr>
           <a:xfrm>
-            <a:off x="1051560" y="1129330"/>
-            <a:ext cx="274320" cy="118781"/>
+            <a:off x="457200" y="1645920"/>
+            <a:ext cx="3840480" cy="1371600"/>
+          </a:xfrm>
+          <a:prstGeom prst="rect">
+            <a:avLst/>
+          </a:prstGeom>
+          <a:solidFill>
+            <a:srgbClr val="2A2A2A"/>
+          </a:solidFill>
+          <a:ln w="12700">
+            <a:solidFill>
+              <a:srgbClr val="555555"/>
+            </a:solidFill>
+            <a:prstDash val="solid"/>
+          </a:ln>
+        </p:spPr>
+      </p:sp>
+      <p:sp>
+        <p:nvSpPr>
+          <p:cNvPr id="6" name="Text 4"/>
+          <p:cNvSpPr/>
+          <p:nvPr/>
+        </p:nvSpPr>
+        <p:spPr>
+          <a:xfrm>
+            <a:off x="548640" y="1737360"/>
+            <a:ext cx="274320" cy="274320"/>
+          </a:xfrm>
+          <a:prstGeom prst="rect">
+            <a:avLst/>
+          </a:prstGeom>
+          <a:solidFill>
+            <a:srgbClr val="FF9999"/>
+          </a:solidFill>
+          <a:ln/>
+        </p:spPr>
+        <p:txBody>
+          <a:bodyPr wrap="square" rtlCol="0" anchor="ctr"/>
+          <a:lstStyle/>
+          <a:p>
+            <a:pPr algn="ctr" indent="0" marL="0">
+              <a:buNone/>
+            </a:pPr>
+            <a:r>
+              <a:rPr lang="en-US" sz="1600" b="1" dirty="0">
+                <a:solidFill>
+                  <a:srgbClr val="FFFFFF"/>
+                </a:solidFill>
+              </a:rPr>
+              <a:t>A</a:t>
+            </a:r>
+            <a:endParaRPr lang="en-US" sz="1600" dirty="0"/>
+          </a:p>
+        </p:txBody>
+      </p:sp>
+      <p:pic>
+        <p:nvPicPr>
+          <p:cNvPr id="7" name="Image 0" descr="q6-answer-a.png">    </p:cNvPr>
+          <p:cNvPicPr>
+            <a:picLocks noChangeAspect="1"/>
+          </p:cNvPicPr>
+          <p:nvPr/>
+        </p:nvPicPr>
+        <p:blipFill>
+          <a:blip r:embed="rId1"/>
+          <a:stretch>
+            <a:fillRect/>
+          </a:stretch>
+        </p:blipFill>
+        <p:spPr>
+          <a:xfrm>
+            <a:off x="1371600" y="1828800"/>
+            <a:ext cx="2286000" cy="914400"/>
+          </a:xfrm>
+          <a:prstGeom prst="rect">
+            <a:avLst/>
+          </a:prstGeom>
+        </p:spPr>
+      </p:pic>
+      <p:sp>
+        <p:nvSpPr>
+          <p:cNvPr id="8" name="Shape 5"/>
+          <p:cNvSpPr/>
+          <p:nvPr/>
+        </p:nvSpPr>
+        <p:spPr>
+          <a:xfrm>
+            <a:off x="4754880" y="1645920"/>
+            <a:ext cx="3840480" cy="1371600"/>
+          </a:xfrm>
+          <a:prstGeom prst="rect">
+            <a:avLst/>
+          </a:prstGeom>
+          <a:solidFill>
+            <a:srgbClr val="2A2A2A"/>
+          </a:solidFill>
+          <a:ln w="12700">
+            <a:solidFill>
+              <a:srgbClr val="555555"/>
+            </a:solidFill>
+            <a:prstDash val="solid"/>
+          </a:ln>
+        </p:spPr>
+      </p:sp>
+      <p:sp>
+        <p:nvSpPr>
+          <p:cNvPr id="9" name="Text 6"/>
+          <p:cNvSpPr/>
+          <p:nvPr/>
+        </p:nvSpPr>
+        <p:spPr>
+          <a:xfrm>
+            <a:off x="4846320" y="1737360"/>
+            <a:ext cx="274320" cy="274320"/>
           </a:xfrm>
           <a:prstGeom prst="rect">
             <a:avLst/>
@@ -5192,79 +5304,6 @@
           <a:solidFill>
             <a:srgbClr val="66B3FF"/>
           </a:solidFill>
-          <a:ln w="12700">
-            <a:solidFill>
-              <a:srgbClr val="000000"/>
-            </a:solidFill>
-            <a:prstDash val="solid"/>
-          </a:ln>
-        </p:spPr>
-      </p:sp>
-      <p:sp>
-        <p:nvSpPr>
-          <p:cNvPr id="6" name="Shape 4"/>
-          <p:cNvSpPr/>
-          <p:nvPr/>
-        </p:nvSpPr>
-        <p:spPr>
-          <a:xfrm flipV="1">
-            <a:off x="1051560" y="1069939"/>
-            <a:ext cx="274320" cy="59390"/>
-          </a:xfrm>
-          <a:prstGeom prst="triangle">
-            <a:avLst/>
-          </a:prstGeom>
-          <a:solidFill>
-            <a:srgbClr val="66B3FF"/>
-          </a:solidFill>
-          <a:ln w="12700">
-            <a:solidFill>
-              <a:srgbClr val="333333"/>
-            </a:solidFill>
-            <a:prstDash val="solid"/>
-          </a:ln>
-        </p:spPr>
-      </p:sp>
-      <p:sp>
-        <p:nvSpPr>
-          <p:cNvPr id="7" name="Shape 5"/>
-          <p:cNvSpPr/>
-          <p:nvPr/>
-        </p:nvSpPr>
-        <p:spPr>
-          <a:xfrm>
-            <a:off x="1051560" y="1248110"/>
-            <a:ext cx="274320" cy="59390"/>
-          </a:xfrm>
-          <a:prstGeom prst="triangle">
-            <a:avLst/>
-          </a:prstGeom>
-          <a:solidFill>
-            <a:srgbClr val="66B3FF"/>
-          </a:solidFill>
-          <a:ln w="12700">
-            <a:solidFill>
-              <a:srgbClr val="333333"/>
-            </a:solidFill>
-            <a:prstDash val="solid"/>
-          </a:ln>
-        </p:spPr>
-      </p:sp>
-      <p:sp>
-        <p:nvSpPr>
-          <p:cNvPr id="8" name="Text 6"/>
-          <p:cNvSpPr/>
-          <p:nvPr/>
-        </p:nvSpPr>
-        <p:spPr>
-          <a:xfrm>
-            <a:off x="1051560" y="1353221"/>
-            <a:ext cx="274320" cy="182880"/>
-          </a:xfrm>
-          <a:prstGeom prst="rect">
-            <a:avLst/>
-          </a:prstGeom>
-          <a:noFill/>
           <a:ln/>
         </p:spPr>
         <p:txBody>
@@ -5275,57 +5314,83 @@
               <a:buNone/>
             </a:pPr>
             <a:r>
-              <a:rPr lang="en-US" sz="1000" dirty="0">
-                <a:solidFill>
-                  <a:srgbClr val="E0E0E0"/>
-                </a:solidFill>
-              </a:rPr>
-              <a:t>Hexagon</a:t>
-            </a:r>
-            <a:endParaRPr lang="en-US" sz="1000" dirty="0"/>
-          </a:p>
-        </p:txBody>
-      </p:sp>
-      <p:sp>
-        <p:nvSpPr>
-          <p:cNvPr id="9" name="Shape 7"/>
-          <p:cNvSpPr/>
-          <p:nvPr/>
-        </p:nvSpPr>
-        <p:spPr>
-          <a:xfrm>
-            <a:off x="2103120" y="1051560"/>
-            <a:ext cx="365760" cy="365760"/>
-          </a:xfrm>
-          <a:prstGeom prst="triangle">
-            <a:avLst/>
-          </a:prstGeom>
-          <a:solidFill>
-            <a:srgbClr val="66B3FF"/>
-          </a:solidFill>
-          <a:ln w="12700">
-            <a:solidFill>
-              <a:srgbClr val="000000"/>
-            </a:solidFill>
-            <a:prstDash val="solid"/>
-          </a:ln>
-        </p:spPr>
-      </p:sp>
-      <p:sp>
-        <p:nvSpPr>
-          <p:cNvPr id="10" name="Text 8"/>
-          <p:cNvSpPr/>
-          <p:nvPr/>
-        </p:nvSpPr>
-        <p:spPr>
-          <a:xfrm>
-            <a:off x="2103120" y="1463040"/>
-            <a:ext cx="365760" cy="182880"/>
-          </a:xfrm>
-          <a:prstGeom prst="rect">
-            <a:avLst/>
-          </a:prstGeom>
-          <a:noFill/>
+              <a:rPr lang="en-US" sz="1600" b="1" dirty="0">
+                <a:solidFill>
+                  <a:srgbClr val="FFFFFF"/>
+                </a:solidFill>
+              </a:rPr>
+              <a:t>B</a:t>
+            </a:r>
+            <a:endParaRPr lang="en-US" sz="1600" dirty="0"/>
+          </a:p>
+        </p:txBody>
+      </p:sp>
+      <p:pic>
+        <p:nvPicPr>
+          <p:cNvPr id="10" name="Image 1" descr="q6-answer-b.png">    </p:cNvPr>
+          <p:cNvPicPr>
+            <a:picLocks noChangeAspect="1"/>
+          </p:cNvPicPr>
+          <p:nvPr/>
+        </p:nvPicPr>
+        <p:blipFill>
+          <a:blip r:embed="rId2"/>
+          <a:stretch>
+            <a:fillRect/>
+          </a:stretch>
+        </p:blipFill>
+        <p:spPr>
+          <a:xfrm>
+            <a:off x="5669280" y="1828800"/>
+            <a:ext cx="2286000" cy="914400"/>
+          </a:xfrm>
+          <a:prstGeom prst="rect">
+            <a:avLst/>
+          </a:prstGeom>
+        </p:spPr>
+      </p:pic>
+      <p:sp>
+        <p:nvSpPr>
+          <p:cNvPr id="11" name="Shape 7"/>
+          <p:cNvSpPr/>
+          <p:nvPr/>
+        </p:nvSpPr>
+        <p:spPr>
+          <a:xfrm>
+            <a:off x="457200" y="3200400"/>
+            <a:ext cx="3840480" cy="1371600"/>
+          </a:xfrm>
+          <a:prstGeom prst="rect">
+            <a:avLst/>
+          </a:prstGeom>
+          <a:solidFill>
+            <a:srgbClr val="2A2A2A"/>
+          </a:solidFill>
+          <a:ln w="12700">
+            <a:solidFill>
+              <a:srgbClr val="555555"/>
+            </a:solidFill>
+            <a:prstDash val="solid"/>
+          </a:ln>
+        </p:spPr>
+      </p:sp>
+      <p:sp>
+        <p:nvSpPr>
+          <p:cNvPr id="12" name="Text 8"/>
+          <p:cNvSpPr/>
+          <p:nvPr/>
+        </p:nvSpPr>
+        <p:spPr>
+          <a:xfrm>
+            <a:off x="548640" y="3291840"/>
+            <a:ext cx="274320" cy="274320"/>
+          </a:xfrm>
+          <a:prstGeom prst="rect">
+            <a:avLst/>
+          </a:prstGeom>
+          <a:solidFill>
+            <a:srgbClr val="FF9999"/>
+          </a:solidFill>
           <a:ln/>
         </p:spPr>
         <p:txBody>
@@ -5336,27 +5401,51 @@
               <a:buNone/>
             </a:pPr>
             <a:r>
-              <a:rPr lang="en-US" sz="1000" dirty="0">
-                <a:solidFill>
-                  <a:srgbClr val="E0E0E0"/>
-                </a:solidFill>
-              </a:rPr>
-              <a:t>Triangle</a:t>
-            </a:r>
-            <a:endParaRPr lang="en-US" sz="1000" dirty="0"/>
-          </a:p>
-        </p:txBody>
-      </p:sp>
-      <p:sp>
-        <p:nvSpPr>
-          <p:cNvPr id="11" name="Shape 9"/>
-          <p:cNvSpPr/>
-          <p:nvPr/>
-        </p:nvSpPr>
-        <p:spPr>
-          <a:xfrm>
-            <a:off x="457200" y="2011680"/>
-            <a:ext cx="3840480" cy="1188720"/>
+              <a:rPr lang="en-US" sz="1600" b="1" dirty="0">
+                <a:solidFill>
+                  <a:srgbClr val="FFFFFF"/>
+                </a:solidFill>
+              </a:rPr>
+              <a:t>C</a:t>
+            </a:r>
+            <a:endParaRPr lang="en-US" sz="1600" dirty="0"/>
+          </a:p>
+        </p:txBody>
+      </p:sp>
+      <p:pic>
+        <p:nvPicPr>
+          <p:cNvPr id="13" name="Image 2" descr="q6-answer-c.png">    </p:cNvPr>
+          <p:cNvPicPr>
+            <a:picLocks noChangeAspect="1"/>
+          </p:cNvPicPr>
+          <p:nvPr/>
+        </p:nvPicPr>
+        <p:blipFill>
+          <a:blip r:embed="rId3"/>
+          <a:stretch>
+            <a:fillRect/>
+          </a:stretch>
+        </p:blipFill>
+        <p:spPr>
+          <a:xfrm>
+            <a:off x="1371600" y="3383280"/>
+            <a:ext cx="2286000" cy="914400"/>
+          </a:xfrm>
+          <a:prstGeom prst="rect">
+            <a:avLst/>
+          </a:prstGeom>
+        </p:spPr>
+      </p:pic>
+      <p:sp>
+        <p:nvSpPr>
+          <p:cNvPr id="14" name="Shape 9"/>
+          <p:cNvSpPr/>
+          <p:nvPr/>
+        </p:nvSpPr>
+        <p:spPr>
+          <a:xfrm>
+            <a:off x="4754880" y="3200400"/>
+            <a:ext cx="3840480" cy="1371600"/>
           </a:xfrm>
           <a:prstGeom prst="rect">
             <a:avLst/>
@@ -5374,13 +5463,13 @@
       </p:sp>
       <p:sp>
         <p:nvSpPr>
-          <p:cNvPr id="12" name="Text 10"/>
-          <p:cNvSpPr/>
-          <p:nvPr/>
-        </p:nvSpPr>
-        <p:spPr>
-          <a:xfrm>
-            <a:off x="548640" y="2103120"/>
+          <p:cNvPr id="15" name="Text 10"/>
+          <p:cNvSpPr/>
+          <p:nvPr/>
+        </p:nvSpPr>
+        <p:spPr>
+          <a:xfrm>
+            <a:off x="4846320" y="3291840"/>
             <a:ext cx="274320" cy="274320"/>
           </a:xfrm>
           <a:prstGeom prst="rect">
@@ -5404,613 +5493,48 @@
                   <a:srgbClr val="FFFFFF"/>
                 </a:solidFill>
               </a:rPr>
-              <a:t>A</a:t>
+              <a:t>D</a:t>
             </a:r>
             <a:endParaRPr lang="en-US" sz="1600" dirty="0"/>
           </a:p>
         </p:txBody>
       </p:sp>
-      <p:sp>
-        <p:nvSpPr>
-          <p:cNvPr id="13" name="Shape 11"/>
-          <p:cNvSpPr/>
-          <p:nvPr/>
-        </p:nvSpPr>
-        <p:spPr>
-          <a:xfrm>
-            <a:off x="1691640" y="2500930"/>
-            <a:ext cx="274320" cy="118781"/>
-          </a:xfrm>
-          <a:prstGeom prst="rect">
-            <a:avLst/>
-          </a:prstGeom>
-          <a:solidFill>
-            <a:srgbClr val="FF9999"/>
-          </a:solidFill>
-          <a:ln w="12700">
-            <a:solidFill>
-              <a:srgbClr val="000000"/>
-            </a:solidFill>
-            <a:prstDash val="solid"/>
-          </a:ln>
-        </p:spPr>
-      </p:sp>
-      <p:sp>
-        <p:nvSpPr>
-          <p:cNvPr id="14" name="Shape 12"/>
-          <p:cNvSpPr/>
-          <p:nvPr/>
-        </p:nvSpPr>
-        <p:spPr>
-          <a:xfrm flipV="1">
-            <a:off x="1691640" y="2441539"/>
-            <a:ext cx="274320" cy="59390"/>
-          </a:xfrm>
-          <a:prstGeom prst="triangle">
-            <a:avLst/>
-          </a:prstGeom>
-          <a:solidFill>
-            <a:srgbClr val="FF9999"/>
-          </a:solidFill>
-          <a:ln w="12700">
-            <a:solidFill>
-              <a:srgbClr val="333333"/>
-            </a:solidFill>
-            <a:prstDash val="solid"/>
-          </a:ln>
-        </p:spPr>
-      </p:sp>
-      <p:sp>
-        <p:nvSpPr>
-          <p:cNvPr id="15" name="Shape 13"/>
-          <p:cNvSpPr/>
-          <p:nvPr/>
-        </p:nvSpPr>
-        <p:spPr>
-          <a:xfrm>
-            <a:off x="1691640" y="2619710"/>
-            <a:ext cx="274320" cy="59390"/>
-          </a:xfrm>
-          <a:prstGeom prst="triangle">
-            <a:avLst/>
-          </a:prstGeom>
-          <a:solidFill>
-            <a:srgbClr val="FF9999"/>
-          </a:solidFill>
-          <a:ln w="12700">
-            <a:solidFill>
-              <a:srgbClr val="333333"/>
-            </a:solidFill>
-            <a:prstDash val="solid"/>
-          </a:ln>
-        </p:spPr>
-      </p:sp>
-      <p:sp>
-        <p:nvSpPr>
-          <p:cNvPr id="16" name="Shape 14"/>
-          <p:cNvSpPr/>
-          <p:nvPr/>
-        </p:nvSpPr>
-        <p:spPr>
-          <a:xfrm>
-            <a:off x="2194560" y="2468880"/>
-            <a:ext cx="274320" cy="274320"/>
-          </a:xfrm>
-          <a:prstGeom prst="triangle">
-            <a:avLst/>
-          </a:prstGeom>
-          <a:solidFill>
-            <a:srgbClr val="FF9999"/>
-          </a:solidFill>
-          <a:ln w="12700">
-            <a:solidFill>
-              <a:srgbClr val="000000"/>
-            </a:solidFill>
-            <a:prstDash val="solid"/>
-          </a:ln>
-        </p:spPr>
-      </p:sp>
-      <p:sp>
-        <p:nvSpPr>
-          <p:cNvPr id="17" name="Shape 15"/>
-          <p:cNvSpPr/>
-          <p:nvPr/>
-        </p:nvSpPr>
-        <p:spPr>
-          <a:xfrm>
-            <a:off x="4754880" y="2011680"/>
-            <a:ext cx="3840480" cy="1188720"/>
-          </a:xfrm>
-          <a:prstGeom prst="rect">
-            <a:avLst/>
-          </a:prstGeom>
-          <a:solidFill>
-            <a:srgbClr val="2A2A2A"/>
-          </a:solidFill>
-          <a:ln w="12700">
-            <a:solidFill>
-              <a:srgbClr val="555555"/>
-            </a:solidFill>
-            <a:prstDash val="solid"/>
-          </a:ln>
-        </p:spPr>
-      </p:sp>
-      <p:sp>
-        <p:nvSpPr>
-          <p:cNvPr id="18" name="Text 16"/>
-          <p:cNvSpPr/>
-          <p:nvPr/>
-        </p:nvSpPr>
-        <p:spPr>
-          <a:xfrm>
-            <a:off x="4846320" y="2103120"/>
-            <a:ext cx="274320" cy="274320"/>
-          </a:xfrm>
-          <a:prstGeom prst="rect">
-            <a:avLst/>
-          </a:prstGeom>
-          <a:solidFill>
-            <a:srgbClr val="66B3FF"/>
-          </a:solidFill>
-          <a:ln/>
-        </p:spPr>
-        <p:txBody>
-          <a:bodyPr wrap="square" rtlCol="0" anchor="ctr"/>
-          <a:lstStyle/>
-          <a:p>
-            <a:pPr algn="ctr" indent="0" marL="0">
-              <a:buNone/>
-            </a:pPr>
-            <a:r>
-              <a:rPr lang="en-US" sz="1600" b="1" dirty="0">
-                <a:solidFill>
-                  <a:srgbClr val="FFFFFF"/>
-                </a:solidFill>
-              </a:rPr>
-              <a:t>B</a:t>
-            </a:r>
-            <a:endParaRPr lang="en-US" sz="1600" dirty="0"/>
-          </a:p>
-        </p:txBody>
-      </p:sp>
-      <p:sp>
-        <p:nvSpPr>
-          <p:cNvPr id="19" name="Shape 17"/>
-          <p:cNvSpPr/>
-          <p:nvPr/>
-        </p:nvSpPr>
-        <p:spPr>
-          <a:xfrm>
-            <a:off x="6446520" y="2683810"/>
-            <a:ext cx="274320" cy="118781"/>
-          </a:xfrm>
-          <a:prstGeom prst="rect">
-            <a:avLst/>
-          </a:prstGeom>
-          <a:solidFill>
-            <a:srgbClr val="66B3FF"/>
-          </a:solidFill>
-          <a:ln w="12700">
-            <a:solidFill>
-              <a:srgbClr val="000000"/>
-            </a:solidFill>
-            <a:prstDash val="solid"/>
-          </a:ln>
-        </p:spPr>
-      </p:sp>
-      <p:sp>
-        <p:nvSpPr>
-          <p:cNvPr id="20" name="Shape 18"/>
-          <p:cNvSpPr/>
-          <p:nvPr/>
-        </p:nvSpPr>
-        <p:spPr>
-          <a:xfrm flipV="1">
-            <a:off x="6446520" y="2624419"/>
-            <a:ext cx="274320" cy="59390"/>
-          </a:xfrm>
-          <a:prstGeom prst="triangle">
-            <a:avLst/>
-          </a:prstGeom>
-          <a:solidFill>
-            <a:srgbClr val="66B3FF"/>
-          </a:solidFill>
-          <a:ln w="12700">
-            <a:solidFill>
-              <a:srgbClr val="333333"/>
-            </a:solidFill>
-            <a:prstDash val="solid"/>
-          </a:ln>
-        </p:spPr>
-      </p:sp>
-      <p:sp>
-        <p:nvSpPr>
-          <p:cNvPr id="21" name="Shape 19"/>
-          <p:cNvSpPr/>
-          <p:nvPr/>
-        </p:nvSpPr>
-        <p:spPr>
-          <a:xfrm>
-            <a:off x="6446520" y="2802590"/>
-            <a:ext cx="274320" cy="59390"/>
-          </a:xfrm>
-          <a:prstGeom prst="triangle">
-            <a:avLst/>
-          </a:prstGeom>
-          <a:solidFill>
-            <a:srgbClr val="66B3FF"/>
-          </a:solidFill>
-          <a:ln w="12700">
-            <a:solidFill>
-              <a:srgbClr val="333333"/>
-            </a:solidFill>
-            <a:prstDash val="solid"/>
-          </a:ln>
-        </p:spPr>
-      </p:sp>
-      <p:sp>
-        <p:nvSpPr>
-          <p:cNvPr id="22" name="Shape 20"/>
-          <p:cNvSpPr/>
-          <p:nvPr/>
-        </p:nvSpPr>
-        <p:spPr>
-          <a:xfrm flipV="1">
-            <a:off x="6446520" y="2331720"/>
-            <a:ext cx="274320" cy="274320"/>
-          </a:xfrm>
-          <a:prstGeom prst="triangle">
-            <a:avLst/>
-          </a:prstGeom>
-          <a:solidFill>
-            <a:srgbClr val="66B3FF"/>
-          </a:solidFill>
-          <a:ln w="12700">
-            <a:solidFill>
-              <a:srgbClr val="000000"/>
-            </a:solidFill>
-            <a:prstDash val="solid"/>
-          </a:ln>
-        </p:spPr>
-      </p:sp>
-      <p:sp>
-        <p:nvSpPr>
-          <p:cNvPr id="23" name="Shape 21"/>
-          <p:cNvSpPr/>
-          <p:nvPr/>
-        </p:nvSpPr>
-        <p:spPr>
-          <a:xfrm>
-            <a:off x="457200" y="3383280"/>
-            <a:ext cx="3840480" cy="1188720"/>
-          </a:xfrm>
-          <a:prstGeom prst="rect">
-            <a:avLst/>
-          </a:prstGeom>
-          <a:solidFill>
-            <a:srgbClr val="2A2A2A"/>
-          </a:solidFill>
-          <a:ln w="12700">
-            <a:solidFill>
-              <a:srgbClr val="555555"/>
-            </a:solidFill>
-            <a:prstDash val="solid"/>
-          </a:ln>
-        </p:spPr>
-      </p:sp>
-      <p:sp>
-        <p:nvSpPr>
-          <p:cNvPr id="24" name="Text 22"/>
-          <p:cNvSpPr/>
-          <p:nvPr/>
-        </p:nvSpPr>
-        <p:spPr>
-          <a:xfrm>
-            <a:off x="548640" y="3474720"/>
-            <a:ext cx="274320" cy="274320"/>
-          </a:xfrm>
-          <a:prstGeom prst="rect">
-            <a:avLst/>
-          </a:prstGeom>
-          <a:solidFill>
-            <a:srgbClr val="FF9999"/>
-          </a:solidFill>
-          <a:ln/>
-        </p:spPr>
-        <p:txBody>
-          <a:bodyPr wrap="square" rtlCol="0" anchor="ctr"/>
-          <a:lstStyle/>
-          <a:p>
-            <a:pPr algn="ctr" indent="0" marL="0">
-              <a:buNone/>
-            </a:pPr>
-            <a:r>
-              <a:rPr lang="en-US" sz="1600" b="1" dirty="0">
-                <a:solidFill>
-                  <a:srgbClr val="FFFFFF"/>
-                </a:solidFill>
-              </a:rPr>
-              <a:t>C</a:t>
-            </a:r>
-            <a:endParaRPr lang="en-US" sz="1600" dirty="0"/>
-          </a:p>
-        </p:txBody>
-      </p:sp>
-      <p:sp>
-        <p:nvSpPr>
-          <p:cNvPr id="25" name="Shape 23"/>
-          <p:cNvSpPr/>
-          <p:nvPr/>
-        </p:nvSpPr>
-        <p:spPr>
-          <a:xfrm>
-            <a:off x="1691640" y="3689650"/>
-            <a:ext cx="274320" cy="118781"/>
-          </a:xfrm>
-          <a:prstGeom prst="rect">
-            <a:avLst/>
-          </a:prstGeom>
-          <a:solidFill>
-            <a:srgbClr val="FF9999"/>
-          </a:solidFill>
-          <a:ln w="12700">
-            <a:solidFill>
-              <a:srgbClr val="000000"/>
-            </a:solidFill>
-            <a:prstDash val="solid"/>
-          </a:ln>
-        </p:spPr>
-      </p:sp>
-      <p:sp>
-        <p:nvSpPr>
-          <p:cNvPr id="26" name="Shape 24"/>
-          <p:cNvSpPr/>
-          <p:nvPr/>
-        </p:nvSpPr>
-        <p:spPr>
-          <a:xfrm flipV="1">
-            <a:off x="1691640" y="3630259"/>
-            <a:ext cx="274320" cy="59390"/>
-          </a:xfrm>
-          <a:prstGeom prst="triangle">
-            <a:avLst/>
-          </a:prstGeom>
-          <a:solidFill>
-            <a:srgbClr val="FF9999"/>
-          </a:solidFill>
-          <a:ln w="12700">
-            <a:solidFill>
-              <a:srgbClr val="333333"/>
-            </a:solidFill>
-            <a:prstDash val="solid"/>
-          </a:ln>
-        </p:spPr>
-      </p:sp>
-      <p:sp>
-        <p:nvSpPr>
-          <p:cNvPr id="27" name="Shape 25"/>
-          <p:cNvSpPr/>
-          <p:nvPr/>
-        </p:nvSpPr>
-        <p:spPr>
-          <a:xfrm>
-            <a:off x="1691640" y="3808430"/>
-            <a:ext cx="274320" cy="59390"/>
-          </a:xfrm>
-          <a:prstGeom prst="triangle">
-            <a:avLst/>
-          </a:prstGeom>
-          <a:solidFill>
-            <a:srgbClr val="FF9999"/>
-          </a:solidFill>
-          <a:ln w="12700">
-            <a:solidFill>
-              <a:srgbClr val="333333"/>
-            </a:solidFill>
-            <a:prstDash val="solid"/>
-          </a:ln>
-        </p:spPr>
-      </p:sp>
-      <p:sp>
-        <p:nvSpPr>
-          <p:cNvPr id="28" name="Shape 26"/>
-          <p:cNvSpPr/>
-          <p:nvPr/>
-        </p:nvSpPr>
-        <p:spPr>
-          <a:xfrm>
-            <a:off x="1691640" y="4069080"/>
-            <a:ext cx="274320" cy="274320"/>
-          </a:xfrm>
-          <a:prstGeom prst="triangle">
-            <a:avLst/>
-          </a:prstGeom>
-          <a:solidFill>
-            <a:srgbClr val="FF9999"/>
-          </a:solidFill>
-          <a:ln w="12700">
-            <a:solidFill>
-              <a:srgbClr val="000000"/>
-            </a:solidFill>
-            <a:prstDash val="solid"/>
-          </a:ln>
-        </p:spPr>
-      </p:sp>
-      <p:sp>
-        <p:nvSpPr>
-          <p:cNvPr id="29" name="Shape 27"/>
-          <p:cNvSpPr/>
-          <p:nvPr/>
-        </p:nvSpPr>
-        <p:spPr>
-          <a:xfrm>
-            <a:off x="4754880" y="3383280"/>
-            <a:ext cx="3840480" cy="1188720"/>
-          </a:xfrm>
-          <a:prstGeom prst="rect">
-            <a:avLst/>
-          </a:prstGeom>
-          <a:solidFill>
-            <a:srgbClr val="2A2A2A"/>
-          </a:solidFill>
-          <a:ln w="12700">
-            <a:solidFill>
-              <a:srgbClr val="555555"/>
-            </a:solidFill>
-            <a:prstDash val="solid"/>
-          </a:ln>
-        </p:spPr>
-      </p:sp>
-      <p:sp>
-        <p:nvSpPr>
-          <p:cNvPr id="30" name="Text 28"/>
-          <p:cNvSpPr/>
-          <p:nvPr/>
-        </p:nvSpPr>
-        <p:spPr>
-          <a:xfrm>
-            <a:off x="4846320" y="3474720"/>
-            <a:ext cx="274320" cy="274320"/>
-          </a:xfrm>
-          <a:prstGeom prst="rect">
-            <a:avLst/>
-          </a:prstGeom>
-          <a:solidFill>
-            <a:srgbClr val="FF9999"/>
-          </a:solidFill>
-          <a:ln/>
-        </p:spPr>
-        <p:txBody>
-          <a:bodyPr wrap="square" rtlCol="0" anchor="ctr"/>
-          <a:lstStyle/>
-          <a:p>
-            <a:pPr algn="ctr" indent="0" marL="0">
-              <a:buNone/>
-            </a:pPr>
-            <a:r>
-              <a:rPr lang="en-US" sz="1600" b="1" dirty="0">
-                <a:solidFill>
-                  <a:srgbClr val="FFFFFF"/>
-                </a:solidFill>
-              </a:rPr>
-              <a:t>D</a:t>
-            </a:r>
-            <a:endParaRPr lang="en-US" sz="1600" dirty="0"/>
-          </a:p>
-        </p:txBody>
-      </p:sp>
-      <p:sp>
-        <p:nvSpPr>
-          <p:cNvPr id="31" name="Shape 29"/>
-          <p:cNvSpPr/>
-          <p:nvPr/>
-        </p:nvSpPr>
-        <p:spPr>
-          <a:xfrm>
-            <a:off x="6446520" y="3689650"/>
-            <a:ext cx="274320" cy="118781"/>
-          </a:xfrm>
-          <a:prstGeom prst="rect">
-            <a:avLst/>
-          </a:prstGeom>
-          <a:solidFill>
-            <a:srgbClr val="FF9999"/>
-          </a:solidFill>
-          <a:ln w="12700">
-            <a:solidFill>
-              <a:srgbClr val="000000"/>
-            </a:solidFill>
-            <a:prstDash val="solid"/>
-          </a:ln>
-        </p:spPr>
-      </p:sp>
-      <p:sp>
-        <p:nvSpPr>
-          <p:cNvPr id="32" name="Shape 30"/>
-          <p:cNvSpPr/>
-          <p:nvPr/>
-        </p:nvSpPr>
-        <p:spPr>
-          <a:xfrm flipV="1">
-            <a:off x="6446520" y="3630259"/>
-            <a:ext cx="274320" cy="59390"/>
-          </a:xfrm>
-          <a:prstGeom prst="triangle">
-            <a:avLst/>
-          </a:prstGeom>
-          <a:solidFill>
-            <a:srgbClr val="FF9999"/>
-          </a:solidFill>
-          <a:ln w="12700">
-            <a:solidFill>
-              <a:srgbClr val="333333"/>
-            </a:solidFill>
-            <a:prstDash val="solid"/>
-          </a:ln>
-        </p:spPr>
-      </p:sp>
-      <p:sp>
-        <p:nvSpPr>
-          <p:cNvPr id="33" name="Shape 31"/>
-          <p:cNvSpPr/>
-          <p:nvPr/>
-        </p:nvSpPr>
-        <p:spPr>
-          <a:xfrm>
-            <a:off x="6446520" y="3808430"/>
-            <a:ext cx="274320" cy="59390"/>
-          </a:xfrm>
-          <a:prstGeom prst="triangle">
-            <a:avLst/>
-          </a:prstGeom>
-          <a:solidFill>
-            <a:srgbClr val="FF9999"/>
-          </a:solidFill>
-          <a:ln w="12700">
-            <a:solidFill>
-              <a:srgbClr val="333333"/>
-            </a:solidFill>
-            <a:prstDash val="solid"/>
-          </a:ln>
-        </p:spPr>
-      </p:sp>
-      <p:sp>
-        <p:nvSpPr>
-          <p:cNvPr id="34" name="Shape 32"/>
-          <p:cNvSpPr/>
-          <p:nvPr/>
-        </p:nvSpPr>
-        <p:spPr>
-          <a:xfrm>
-            <a:off x="6446520" y="4069080"/>
-            <a:ext cx="274320" cy="274320"/>
-          </a:xfrm>
-          <a:prstGeom prst="triangle">
-            <a:avLst/>
-          </a:prstGeom>
-          <a:solidFill>
-            <a:srgbClr val="FF9999"/>
-          </a:solidFill>
-          <a:ln w="12700">
-            <a:solidFill>
-              <a:srgbClr val="000000"/>
-            </a:solidFill>
-            <a:prstDash val="solid"/>
-          </a:ln>
-        </p:spPr>
-      </p:sp>
-      <p:sp>
-        <p:nvSpPr>
-          <p:cNvPr id="35" name="Shape 33">
-            <a:hlinkClick r:id="rId1" tooltip="" action="ppaction://hlinksldjump"/>
+      <p:pic>
+        <p:nvPicPr>
+          <p:cNvPr id="16" name="Image 3" descr="q6-answer-d.png">    </p:cNvPr>
+          <p:cNvPicPr>
+            <a:picLocks noChangeAspect="1"/>
+          </p:cNvPicPr>
+          <p:nvPr/>
+        </p:nvPicPr>
+        <p:blipFill>
+          <a:blip r:embed="rId4"/>
+          <a:stretch>
+            <a:fillRect/>
+          </a:stretch>
+        </p:blipFill>
+        <p:spPr>
+          <a:xfrm>
+            <a:off x="5669280" y="3383280"/>
+            <a:ext cx="2286000" cy="914400"/>
+          </a:xfrm>
+          <a:prstGeom prst="rect">
+            <a:avLst/>
+          </a:prstGeom>
+        </p:spPr>
+      </p:pic>
+      <p:sp>
+        <p:nvSpPr>
+          <p:cNvPr id="17" name="Shape 11">
+            <a:hlinkClick r:id="rId5" tooltip="" action="ppaction://hlinksldjump"/>
           </p:cNvPr>
           <p:cNvSpPr/>
           <p:nvPr/>
         </p:nvSpPr>
         <p:spPr>
           <a:xfrm>
-            <a:off x="457200" y="2011680"/>
-            <a:ext cx="3840480" cy="1188720"/>
+            <a:off x="457200" y="1645920"/>
+            <a:ext cx="3840480" cy="1371600"/>
           </a:xfrm>
           <a:prstGeom prst="rect">
             <a:avLst/>
@@ -6030,16 +5554,16 @@
       </p:sp>
       <p:sp>
         <p:nvSpPr>
-          <p:cNvPr id="36" name="Shape 34">
-            <a:hlinkClick r:id="rId2" tooltip="" action="ppaction://hlinksldjump"/>
+          <p:cNvPr id="18" name="Shape 12">
+            <a:hlinkClick r:id="rId6" tooltip="" action="ppaction://hlinksldjump"/>
           </p:cNvPr>
           <p:cNvSpPr/>
           <p:nvPr/>
         </p:nvSpPr>
         <p:spPr>
           <a:xfrm>
-            <a:off x="4754880" y="2011680"/>
-            <a:ext cx="3840480" cy="1188720"/>
+            <a:off x="4754880" y="1645920"/>
+            <a:ext cx="3840480" cy="1371600"/>
           </a:xfrm>
           <a:prstGeom prst="rect">
             <a:avLst/>
@@ -6059,16 +5583,16 @@
       </p:sp>
       <p:sp>
         <p:nvSpPr>
-          <p:cNvPr id="37" name="Shape 35">
-            <a:hlinkClick r:id="rId3" tooltip="" action="ppaction://hlinksldjump"/>
+          <p:cNvPr id="19" name="Shape 13">
+            <a:hlinkClick r:id="rId7" tooltip="" action="ppaction://hlinksldjump"/>
           </p:cNvPr>
           <p:cNvSpPr/>
           <p:nvPr/>
         </p:nvSpPr>
         <p:spPr>
           <a:xfrm>
-            <a:off x="457200" y="3383280"/>
-            <a:ext cx="3840480" cy="1188720"/>
+            <a:off x="457200" y="3200400"/>
+            <a:ext cx="3840480" cy="1371600"/>
           </a:xfrm>
           <a:prstGeom prst="rect">
             <a:avLst/>
@@ -6088,16 +5612,16 @@
       </p:sp>
       <p:sp>
         <p:nvSpPr>
-          <p:cNvPr id="38" name="Shape 36">
-            <a:hlinkClick r:id="rId4" tooltip="" action="ppaction://hlinksldjump"/>
+          <p:cNvPr id="20" name="Shape 14">
+            <a:hlinkClick r:id="rId8" tooltip="" action="ppaction://hlinksldjump"/>
           </p:cNvPr>
           <p:cNvSpPr/>
           <p:nvPr/>
         </p:nvSpPr>
         <p:spPr>
           <a:xfrm>
-            <a:off x="4754880" y="3383280"/>
-            <a:ext cx="3840480" cy="1188720"/>
+            <a:off x="4754880" y="3200400"/>
+            <a:ext cx="3840480" cy="1371600"/>
           </a:xfrm>
           <a:prstGeom prst="rect">
             <a:avLst/>
@@ -6229,8 +5753,8 @@
         </p:nvSpPr>
         <p:spPr>
           <a:xfrm>
-            <a:off x="4754880" y="2286000"/>
-            <a:ext cx="3840480" cy="1188720"/>
+            <a:off x="3200400" y="2286000"/>
+            <a:ext cx="3840480" cy="1371600"/>
           </a:xfrm>
           <a:prstGeom prst="rect">
             <a:avLst/>
@@ -6254,7 +5778,7 @@
         </p:nvSpPr>
         <p:spPr>
           <a:xfrm>
-            <a:off x="4846320" y="2377440"/>
+            <a:off x="3291840" y="2377440"/>
             <a:ext cx="274320" cy="274320"/>
           </a:xfrm>
           <a:prstGeom prst="rect">
@@ -6286,107 +5810,67 @@
       </p:sp>
       <p:sp>
         <p:nvSpPr>
-          <p:cNvPr id="6" name="Shape 4"/>
-          <p:cNvSpPr/>
-          <p:nvPr/>
-        </p:nvSpPr>
-        <p:spPr>
-          <a:xfrm>
-            <a:off x="6446520" y="2958130"/>
-            <a:ext cx="274320" cy="118781"/>
-          </a:xfrm>
-          <a:prstGeom prst="rect">
-            <a:avLst/>
-          </a:prstGeom>
-          <a:solidFill>
-            <a:srgbClr val="66B3FF"/>
-          </a:solidFill>
-          <a:ln w="12700">
-            <a:solidFill>
-              <a:srgbClr val="000000"/>
-            </a:solidFill>
-            <a:prstDash val="solid"/>
-          </a:ln>
-        </p:spPr>
-      </p:sp>
-      <p:sp>
-        <p:nvSpPr>
-          <p:cNvPr id="7" name="Shape 5"/>
-          <p:cNvSpPr/>
-          <p:nvPr/>
-        </p:nvSpPr>
-        <p:spPr>
-          <a:xfrm flipV="1">
-            <a:off x="6446520" y="2898739"/>
-            <a:ext cx="274320" cy="59390"/>
-          </a:xfrm>
-          <a:prstGeom prst="triangle">
-            <a:avLst/>
-          </a:prstGeom>
-          <a:solidFill>
-            <a:srgbClr val="66B3FF"/>
-          </a:solidFill>
-          <a:ln w="12700">
-            <a:solidFill>
-              <a:srgbClr val="333333"/>
-            </a:solidFill>
-            <a:prstDash val="solid"/>
-          </a:ln>
-        </p:spPr>
-      </p:sp>
-      <p:sp>
-        <p:nvSpPr>
-          <p:cNvPr id="8" name="Shape 6"/>
-          <p:cNvSpPr/>
-          <p:nvPr/>
-        </p:nvSpPr>
-        <p:spPr>
-          <a:xfrm>
-            <a:off x="6446520" y="3076910"/>
-            <a:ext cx="274320" cy="59390"/>
-          </a:xfrm>
-          <a:prstGeom prst="triangle">
-            <a:avLst/>
-          </a:prstGeom>
-          <a:solidFill>
-            <a:srgbClr val="66B3FF"/>
-          </a:solidFill>
-          <a:ln w="12700">
-            <a:solidFill>
-              <a:srgbClr val="333333"/>
-            </a:solidFill>
-            <a:prstDash val="solid"/>
-          </a:ln>
-        </p:spPr>
-      </p:sp>
-      <p:sp>
-        <p:nvSpPr>
-          <p:cNvPr id="9" name="Shape 7"/>
-          <p:cNvSpPr/>
-          <p:nvPr/>
-        </p:nvSpPr>
-        <p:spPr>
-          <a:xfrm flipV="1">
-            <a:off x="6446520" y="2606040"/>
-            <a:ext cx="274320" cy="274320"/>
-          </a:xfrm>
-          <a:prstGeom prst="triangle">
-            <a:avLst/>
-          </a:prstGeom>
-          <a:solidFill>
-            <a:srgbClr val="66B3FF"/>
-          </a:solidFill>
-          <a:ln w="12700">
-            <a:solidFill>
-              <a:srgbClr val="000000"/>
-            </a:solidFill>
-            <a:prstDash val="solid"/>
-          </a:ln>
-        </p:spPr>
-      </p:sp>
-      <p:sp>
-        <p:nvSpPr>
-          <p:cNvPr id="10" name="Shape 8"/>
+          <p:cNvPr id="6" name="Text 4"/>
+          <p:cNvSpPr/>
+          <p:nvPr/>
+        </p:nvSpPr>
+        <p:spPr>
+          <a:xfrm>
+            <a:off x="3657600" y="2377440"/>
+            <a:ext cx="3200400" cy="274320"/>
+          </a:xfrm>
+          <a:prstGeom prst="rect">
+            <a:avLst/>
+          </a:prstGeom>
+          <a:noFill/>
+          <a:ln/>
+        </p:spPr>
+        <p:txBody>
+          <a:bodyPr wrap="square" rtlCol="0" anchor="ctr"/>
+          <a:lstStyle/>
+          <a:p>
+            <a:pPr indent="0" marL="0">
+              <a:buNone/>
+            </a:pPr>
+            <a:r>
+              <a:rPr lang="en-US" sz="1400" b="1" dirty="0">
+                <a:solidFill>
+                  <a:srgbClr val="2ECC71"/>
+                </a:solidFill>
+              </a:rPr>
+              <a:t>✓ Correct Answer</a:t>
+            </a:r>
+            <a:endParaRPr lang="en-US" sz="1400" dirty="0"/>
+          </a:p>
+        </p:txBody>
+      </p:sp>
+      <p:pic>
+        <p:nvPicPr>
+          <p:cNvPr id="7" name="Image 0" descr="q6-answer-b.png">    </p:cNvPr>
+          <p:cNvPicPr>
+            <a:picLocks noChangeAspect="1"/>
+          </p:cNvPicPr>
+          <p:nvPr/>
+        </p:nvPicPr>
+        <p:blipFill>
+          <a:blip r:embed="rId1"/>
+          <a:stretch>
+            <a:fillRect/>
+          </a:stretch>
+        </p:blipFill>
+        <p:spPr>
+          <a:xfrm>
+            <a:off x="4114800" y="2651760"/>
+            <a:ext cx="2286000" cy="914400"/>
+          </a:xfrm>
+          <a:prstGeom prst="rect">
+            <a:avLst/>
+          </a:prstGeom>
+        </p:spPr>
+      </p:pic>
+      <p:sp>
+        <p:nvSpPr>
+          <p:cNvPr id="8" name="Shape 5"/>
           <p:cNvSpPr/>
           <p:nvPr/>
         </p:nvSpPr>
@@ -6411,8 +5895,8 @@
       </p:sp>
       <p:sp>
         <p:nvSpPr>
-          <p:cNvPr id="11" name="Text 9">
-            <a:hlinkClick r:id="rId1" tooltip="" action="ppaction://hlinksldjump"/>
+          <p:cNvPr id="9" name="Text 6">
+            <a:hlinkClick r:id="rId2" tooltip="" action="ppaction://hlinksldjump"/>
           </p:cNvPr>
           <p:cNvSpPr/>
           <p:nvPr/>
@@ -6440,7 +5924,7 @@
                 <a:solidFill>
                   <a:srgbClr val="FFFFFF"/>
                 </a:solidFill>
-                <a:hlinkClick r:id="rId1" action="ppaction://hlinksldjump" tooltip="">
+                <a:hlinkClick r:id="rId2" action="ppaction://hlinksldjump" tooltip="">
                   <a:extLst>
                     <a:ext uri="{A12FA001-AC4F-418D-AE19-62706E023703}">
                       <ahyp:hlinkClr xmlns:ahyp="http://schemas.microsoft.com/office/drawing/2018/hyperlinkcolor" val="tx"/>
@@ -6569,7 +6053,7 @@
         <p:spPr>
           <a:xfrm>
             <a:off x="640080" y="822960"/>
-            <a:ext cx="1828800" cy="274320"/>
+            <a:ext cx="3657600" cy="274320"/>
           </a:xfrm>
           <a:prstGeom prst="rect">
             <a:avLst/>
@@ -6590,7 +6074,7 @@
                   <a:srgbClr val="E0E0E0"/>
                 </a:solidFill>
               </a:rPr>
-              <a:t>Given shapes:</a:t>
+              <a:t>Given shapes: Parallelogram + Square</a:t>
             </a:r>
             <a:endParaRPr lang="en-US" sz="1400" dirty="0"/>
           </a:p>
@@ -6603,9 +6087,208 @@
           <p:nvPr/>
         </p:nvSpPr>
         <p:spPr>
-          <a:xfrm rot="1233363">
-            <a:off x="1005840" y="1097280"/>
-            <a:ext cx="548640" cy="365760"/>
+          <a:xfrm>
+            <a:off x="457200" y="1645920"/>
+            <a:ext cx="3840480" cy="1371600"/>
+          </a:xfrm>
+          <a:prstGeom prst="rect">
+            <a:avLst/>
+          </a:prstGeom>
+          <a:solidFill>
+            <a:srgbClr val="2A2A2A"/>
+          </a:solidFill>
+          <a:ln w="12700">
+            <a:solidFill>
+              <a:srgbClr val="555555"/>
+            </a:solidFill>
+            <a:prstDash val="solid"/>
+          </a:ln>
+        </p:spPr>
+      </p:sp>
+      <p:sp>
+        <p:nvSpPr>
+          <p:cNvPr id="6" name="Text 4"/>
+          <p:cNvSpPr/>
+          <p:nvPr/>
+        </p:nvSpPr>
+        <p:spPr>
+          <a:xfrm>
+            <a:off x="548640" y="1737360"/>
+            <a:ext cx="274320" cy="274320"/>
+          </a:xfrm>
+          <a:prstGeom prst="rect">
+            <a:avLst/>
+          </a:prstGeom>
+          <a:solidFill>
+            <a:srgbClr val="FF9999"/>
+          </a:solidFill>
+          <a:ln/>
+        </p:spPr>
+        <p:txBody>
+          <a:bodyPr wrap="square" rtlCol="0" anchor="ctr"/>
+          <a:lstStyle/>
+          <a:p>
+            <a:pPr algn="ctr" indent="0" marL="0">
+              <a:buNone/>
+            </a:pPr>
+            <a:r>
+              <a:rPr lang="en-US" sz="1600" b="1" dirty="0">
+                <a:solidFill>
+                  <a:srgbClr val="FFFFFF"/>
+                </a:solidFill>
+              </a:rPr>
+              <a:t>A</a:t>
+            </a:r>
+            <a:endParaRPr lang="en-US" sz="1600" dirty="0"/>
+          </a:p>
+        </p:txBody>
+      </p:sp>
+      <p:pic>
+        <p:nvPicPr>
+          <p:cNvPr id="7" name="Image 0" descr="q7-answer-a.png">    </p:cNvPr>
+          <p:cNvPicPr>
+            <a:picLocks noChangeAspect="1"/>
+          </p:cNvPicPr>
+          <p:nvPr/>
+        </p:nvPicPr>
+        <p:blipFill>
+          <a:blip r:embed="rId1"/>
+          <a:stretch>
+            <a:fillRect/>
+          </a:stretch>
+        </p:blipFill>
+        <p:spPr>
+          <a:xfrm>
+            <a:off x="1371600" y="1828800"/>
+            <a:ext cx="2286000" cy="914400"/>
+          </a:xfrm>
+          <a:prstGeom prst="rect">
+            <a:avLst/>
+          </a:prstGeom>
+        </p:spPr>
+      </p:pic>
+      <p:sp>
+        <p:nvSpPr>
+          <p:cNvPr id="8" name="Shape 5"/>
+          <p:cNvSpPr/>
+          <p:nvPr/>
+        </p:nvSpPr>
+        <p:spPr>
+          <a:xfrm>
+            <a:off x="4754880" y="1645920"/>
+            <a:ext cx="3840480" cy="1371600"/>
+          </a:xfrm>
+          <a:prstGeom prst="rect">
+            <a:avLst/>
+          </a:prstGeom>
+          <a:solidFill>
+            <a:srgbClr val="2A2A2A"/>
+          </a:solidFill>
+          <a:ln w="12700">
+            <a:solidFill>
+              <a:srgbClr val="555555"/>
+            </a:solidFill>
+            <a:prstDash val="solid"/>
+          </a:ln>
+        </p:spPr>
+      </p:sp>
+      <p:sp>
+        <p:nvSpPr>
+          <p:cNvPr id="9" name="Text 6"/>
+          <p:cNvSpPr/>
+          <p:nvPr/>
+        </p:nvSpPr>
+        <p:spPr>
+          <a:xfrm>
+            <a:off x="4846320" y="1737360"/>
+            <a:ext cx="274320" cy="274320"/>
+          </a:xfrm>
+          <a:prstGeom prst="rect">
+            <a:avLst/>
+          </a:prstGeom>
+          <a:solidFill>
+            <a:srgbClr val="FF9999"/>
+          </a:solidFill>
+          <a:ln/>
+        </p:spPr>
+        <p:txBody>
+          <a:bodyPr wrap="square" rtlCol="0" anchor="ctr"/>
+          <a:lstStyle/>
+          <a:p>
+            <a:pPr algn="ctr" indent="0" marL="0">
+              <a:buNone/>
+            </a:pPr>
+            <a:r>
+              <a:rPr lang="en-US" sz="1600" b="1" dirty="0">
+                <a:solidFill>
+                  <a:srgbClr val="FFFFFF"/>
+                </a:solidFill>
+              </a:rPr>
+              <a:t>B</a:t>
+            </a:r>
+            <a:endParaRPr lang="en-US" sz="1600" dirty="0"/>
+          </a:p>
+        </p:txBody>
+      </p:sp>
+      <p:pic>
+        <p:nvPicPr>
+          <p:cNvPr id="10" name="Image 1" descr="q7-answer-b.png">    </p:cNvPr>
+          <p:cNvPicPr>
+            <a:picLocks noChangeAspect="1"/>
+          </p:cNvPicPr>
+          <p:nvPr/>
+        </p:nvPicPr>
+        <p:blipFill>
+          <a:blip r:embed="rId2"/>
+          <a:stretch>
+            <a:fillRect/>
+          </a:stretch>
+        </p:blipFill>
+        <p:spPr>
+          <a:xfrm>
+            <a:off x="5669280" y="1828800"/>
+            <a:ext cx="2286000" cy="914400"/>
+          </a:xfrm>
+          <a:prstGeom prst="rect">
+            <a:avLst/>
+          </a:prstGeom>
+        </p:spPr>
+      </p:pic>
+      <p:sp>
+        <p:nvSpPr>
+          <p:cNvPr id="11" name="Shape 7"/>
+          <p:cNvSpPr/>
+          <p:nvPr/>
+        </p:nvSpPr>
+        <p:spPr>
+          <a:xfrm>
+            <a:off x="457200" y="3200400"/>
+            <a:ext cx="3840480" cy="1371600"/>
+          </a:xfrm>
+          <a:prstGeom prst="rect">
+            <a:avLst/>
+          </a:prstGeom>
+          <a:solidFill>
+            <a:srgbClr val="2A2A2A"/>
+          </a:solidFill>
+          <a:ln w="12700">
+            <a:solidFill>
+              <a:srgbClr val="555555"/>
+            </a:solidFill>
+            <a:prstDash val="solid"/>
+          </a:ln>
+        </p:spPr>
+      </p:sp>
+      <p:sp>
+        <p:nvSpPr>
+          <p:cNvPr id="12" name="Text 8"/>
+          <p:cNvSpPr/>
+          <p:nvPr/>
+        </p:nvSpPr>
+        <p:spPr>
+          <a:xfrm>
+            <a:off x="548640" y="3291840"/>
+            <a:ext cx="274320" cy="274320"/>
           </a:xfrm>
           <a:prstGeom prst="rect">
             <a:avLst/>
@@ -6613,29 +6296,6 @@
           <a:solidFill>
             <a:srgbClr val="66B3FF"/>
           </a:solidFill>
-          <a:ln w="12700">
-            <a:solidFill>
-              <a:srgbClr val="000000"/>
-            </a:solidFill>
-            <a:prstDash val="solid"/>
-          </a:ln>
-        </p:spPr>
-      </p:sp>
-      <p:sp>
-        <p:nvSpPr>
-          <p:cNvPr id="6" name="Text 4"/>
-          <p:cNvSpPr/>
-          <p:nvPr/>
-        </p:nvSpPr>
-        <p:spPr>
-          <a:xfrm>
-            <a:off x="1005840" y="1508760"/>
-            <a:ext cx="548640" cy="182880"/>
-          </a:xfrm>
-          <a:prstGeom prst="rect">
-            <a:avLst/>
-          </a:prstGeom>
-          <a:noFill/>
           <a:ln/>
         </p:spPr>
         <p:txBody>
@@ -6646,57 +6306,83 @@
               <a:buNone/>
             </a:pPr>
             <a:r>
-              <a:rPr lang="en-US" sz="1000" dirty="0">
-                <a:solidFill>
-                  <a:srgbClr val="E0E0E0"/>
-                </a:solidFill>
-              </a:rPr>
-              <a:t>Parallelogram</a:t>
-            </a:r>
-            <a:endParaRPr lang="en-US" sz="1000" dirty="0"/>
-          </a:p>
-        </p:txBody>
-      </p:sp>
-      <p:sp>
-        <p:nvSpPr>
-          <p:cNvPr id="7" name="Shape 5"/>
-          <p:cNvSpPr/>
-          <p:nvPr/>
-        </p:nvSpPr>
-        <p:spPr>
-          <a:xfrm>
-            <a:off x="2011680" y="1097280"/>
-            <a:ext cx="365760" cy="365760"/>
-          </a:xfrm>
-          <a:prstGeom prst="rect">
-            <a:avLst/>
-          </a:prstGeom>
-          <a:solidFill>
-            <a:srgbClr val="66B3FF"/>
-          </a:solidFill>
-          <a:ln w="12700">
-            <a:solidFill>
-              <a:srgbClr val="000000"/>
-            </a:solidFill>
-            <a:prstDash val="solid"/>
-          </a:ln>
-        </p:spPr>
-      </p:sp>
-      <p:sp>
-        <p:nvSpPr>
-          <p:cNvPr id="8" name="Text 6"/>
-          <p:cNvSpPr/>
-          <p:nvPr/>
-        </p:nvSpPr>
-        <p:spPr>
-          <a:xfrm>
-            <a:off x="2011680" y="1508760"/>
-            <a:ext cx="365760" cy="182880"/>
-          </a:xfrm>
-          <a:prstGeom prst="rect">
-            <a:avLst/>
-          </a:prstGeom>
-          <a:noFill/>
+              <a:rPr lang="en-US" sz="1600" b="1" dirty="0">
+                <a:solidFill>
+                  <a:srgbClr val="FFFFFF"/>
+                </a:solidFill>
+              </a:rPr>
+              <a:t>C</a:t>
+            </a:r>
+            <a:endParaRPr lang="en-US" sz="1600" dirty="0"/>
+          </a:p>
+        </p:txBody>
+      </p:sp>
+      <p:pic>
+        <p:nvPicPr>
+          <p:cNvPr id="13" name="Image 2" descr="q7-answer-c.png">    </p:cNvPr>
+          <p:cNvPicPr>
+            <a:picLocks noChangeAspect="1"/>
+          </p:cNvPicPr>
+          <p:nvPr/>
+        </p:nvPicPr>
+        <p:blipFill>
+          <a:blip r:embed="rId3"/>
+          <a:stretch>
+            <a:fillRect/>
+          </a:stretch>
+        </p:blipFill>
+        <p:spPr>
+          <a:xfrm>
+            <a:off x="1371600" y="3383280"/>
+            <a:ext cx="2286000" cy="914400"/>
+          </a:xfrm>
+          <a:prstGeom prst="rect">
+            <a:avLst/>
+          </a:prstGeom>
+        </p:spPr>
+      </p:pic>
+      <p:sp>
+        <p:nvSpPr>
+          <p:cNvPr id="14" name="Shape 9"/>
+          <p:cNvSpPr/>
+          <p:nvPr/>
+        </p:nvSpPr>
+        <p:spPr>
+          <a:xfrm>
+            <a:off x="4754880" y="3200400"/>
+            <a:ext cx="3840480" cy="1371600"/>
+          </a:xfrm>
+          <a:prstGeom prst="rect">
+            <a:avLst/>
+          </a:prstGeom>
+          <a:solidFill>
+            <a:srgbClr val="2A2A2A"/>
+          </a:solidFill>
+          <a:ln w="12700">
+            <a:solidFill>
+              <a:srgbClr val="555555"/>
+            </a:solidFill>
+            <a:prstDash val="solid"/>
+          </a:ln>
+        </p:spPr>
+      </p:sp>
+      <p:sp>
+        <p:nvSpPr>
+          <p:cNvPr id="15" name="Text 10"/>
+          <p:cNvSpPr/>
+          <p:nvPr/>
+        </p:nvSpPr>
+        <p:spPr>
+          <a:xfrm>
+            <a:off x="4846320" y="3291840"/>
+            <a:ext cx="274320" cy="274320"/>
+          </a:xfrm>
+          <a:prstGeom prst="rect">
+            <a:avLst/>
+          </a:prstGeom>
+          <a:solidFill>
+            <a:srgbClr val="FF9999"/>
+          </a:solidFill>
           <a:ln/>
         </p:spPr>
         <p:txBody>
@@ -6707,481 +6393,53 @@
               <a:buNone/>
             </a:pPr>
             <a:r>
-              <a:rPr lang="en-US" sz="1000" dirty="0">
-                <a:solidFill>
-                  <a:srgbClr val="E0E0E0"/>
-                </a:solidFill>
-              </a:rPr>
-              <a:t>Square</a:t>
-            </a:r>
-            <a:endParaRPr lang="en-US" sz="1000" dirty="0"/>
-          </a:p>
-        </p:txBody>
-      </p:sp>
-      <p:sp>
-        <p:nvSpPr>
-          <p:cNvPr id="9" name="Shape 7"/>
-          <p:cNvSpPr/>
-          <p:nvPr/>
-        </p:nvSpPr>
-        <p:spPr>
-          <a:xfrm>
-            <a:off x="457200" y="2011680"/>
-            <a:ext cx="3840480" cy="1188720"/>
-          </a:xfrm>
-          <a:prstGeom prst="rect">
-            <a:avLst/>
-          </a:prstGeom>
-          <a:solidFill>
-            <a:srgbClr val="2A2A2A"/>
-          </a:solidFill>
-          <a:ln w="12700">
-            <a:solidFill>
-              <a:srgbClr val="555555"/>
-            </a:solidFill>
-            <a:prstDash val="solid"/>
-          </a:ln>
-        </p:spPr>
-      </p:sp>
-      <p:sp>
-        <p:nvSpPr>
-          <p:cNvPr id="10" name="Text 8"/>
-          <p:cNvSpPr/>
-          <p:nvPr/>
-        </p:nvSpPr>
-        <p:spPr>
-          <a:xfrm>
-            <a:off x="548640" y="2103120"/>
-            <a:ext cx="274320" cy="274320"/>
-          </a:xfrm>
-          <a:prstGeom prst="rect">
-            <a:avLst/>
-          </a:prstGeom>
-          <a:solidFill>
-            <a:srgbClr val="FF9999"/>
-          </a:solidFill>
-          <a:ln/>
-        </p:spPr>
-        <p:txBody>
-          <a:bodyPr wrap="square" rtlCol="0" anchor="ctr"/>
-          <a:lstStyle/>
-          <a:p>
-            <a:pPr algn="ctr" indent="0" marL="0">
-              <a:buNone/>
-            </a:pPr>
-            <a:r>
               <a:rPr lang="en-US" sz="1600" b="1" dirty="0">
                 <a:solidFill>
                   <a:srgbClr val="FFFFFF"/>
                 </a:solidFill>
               </a:rPr>
-              <a:t>A</a:t>
+              <a:t>D</a:t>
             </a:r>
             <a:endParaRPr lang="en-US" sz="1600" dirty="0"/>
           </a:p>
         </p:txBody>
       </p:sp>
-      <p:sp>
-        <p:nvSpPr>
-          <p:cNvPr id="11" name="Shape 9"/>
-          <p:cNvSpPr/>
-          <p:nvPr/>
-        </p:nvSpPr>
-        <p:spPr>
-          <a:xfrm rot="1233363">
-            <a:off x="1371600" y="2468880"/>
-            <a:ext cx="548640" cy="365760"/>
-          </a:xfrm>
-          <a:prstGeom prst="rect">
-            <a:avLst/>
-          </a:prstGeom>
-          <a:solidFill>
-            <a:srgbClr val="FF9999"/>
-          </a:solidFill>
-          <a:ln w="12700">
-            <a:solidFill>
-              <a:srgbClr val="000000"/>
-            </a:solidFill>
-            <a:prstDash val="solid"/>
-          </a:ln>
-        </p:spPr>
-      </p:sp>
-      <p:sp>
-        <p:nvSpPr>
-          <p:cNvPr id="12" name="Shape 10"/>
-          <p:cNvSpPr/>
-          <p:nvPr/>
-        </p:nvSpPr>
-        <p:spPr>
-          <a:xfrm>
-            <a:off x="2011680" y="2468880"/>
-            <a:ext cx="365760" cy="365760"/>
-          </a:xfrm>
-          <a:prstGeom prst="rect">
-            <a:avLst/>
-          </a:prstGeom>
-          <a:solidFill>
-            <a:srgbClr val="FF9999"/>
-          </a:solidFill>
-          <a:ln w="12700">
-            <a:solidFill>
-              <a:srgbClr val="000000"/>
-            </a:solidFill>
-            <a:prstDash val="solid"/>
-          </a:ln>
-        </p:spPr>
-      </p:sp>
-      <p:sp>
-        <p:nvSpPr>
-          <p:cNvPr id="13" name="Shape 11"/>
-          <p:cNvSpPr/>
-          <p:nvPr/>
-        </p:nvSpPr>
-        <p:spPr>
-          <a:xfrm>
-            <a:off x="4754880" y="2011680"/>
-            <a:ext cx="3840480" cy="1188720"/>
-          </a:xfrm>
-          <a:prstGeom prst="rect">
-            <a:avLst/>
-          </a:prstGeom>
-          <a:solidFill>
-            <a:srgbClr val="2A2A2A"/>
-          </a:solidFill>
-          <a:ln w="12700">
-            <a:solidFill>
-              <a:srgbClr val="555555"/>
-            </a:solidFill>
-            <a:prstDash val="solid"/>
-          </a:ln>
-        </p:spPr>
-      </p:sp>
-      <p:sp>
-        <p:nvSpPr>
-          <p:cNvPr id="14" name="Text 12"/>
-          <p:cNvSpPr/>
-          <p:nvPr/>
-        </p:nvSpPr>
-        <p:spPr>
-          <a:xfrm>
-            <a:off x="4846320" y="2103120"/>
-            <a:ext cx="274320" cy="274320"/>
-          </a:xfrm>
-          <a:prstGeom prst="rect">
-            <a:avLst/>
-          </a:prstGeom>
-          <a:solidFill>
-            <a:srgbClr val="FF9999"/>
-          </a:solidFill>
-          <a:ln/>
-        </p:spPr>
-        <p:txBody>
-          <a:bodyPr wrap="square" rtlCol="0" anchor="ctr"/>
-          <a:lstStyle/>
-          <a:p>
-            <a:pPr algn="ctr" indent="0" marL="0">
-              <a:buNone/>
-            </a:pPr>
-            <a:r>
-              <a:rPr lang="en-US" sz="1600" b="1" dirty="0">
-                <a:solidFill>
-                  <a:srgbClr val="FFFFFF"/>
-                </a:solidFill>
-              </a:rPr>
-              <a:t>B</a:t>
-            </a:r>
-            <a:endParaRPr lang="en-US" sz="1600" dirty="0"/>
-          </a:p>
-        </p:txBody>
-      </p:sp>
-      <p:sp>
-        <p:nvSpPr>
-          <p:cNvPr id="15" name="Shape 13"/>
-          <p:cNvSpPr/>
-          <p:nvPr/>
-        </p:nvSpPr>
-        <p:spPr>
-          <a:xfrm>
-            <a:off x="5943600" y="2468880"/>
-            <a:ext cx="365760" cy="365760"/>
-          </a:xfrm>
-          <a:prstGeom prst="rect">
-            <a:avLst/>
-          </a:prstGeom>
-          <a:solidFill>
-            <a:srgbClr val="FF9999"/>
-          </a:solidFill>
-          <a:ln w="12700">
-            <a:solidFill>
-              <a:srgbClr val="000000"/>
-            </a:solidFill>
-            <a:prstDash val="solid"/>
-          </a:ln>
-        </p:spPr>
-      </p:sp>
-      <p:sp>
-        <p:nvSpPr>
-          <p:cNvPr id="16" name="Shape 14"/>
-          <p:cNvSpPr/>
-          <p:nvPr/>
-        </p:nvSpPr>
-        <p:spPr>
-          <a:xfrm rot="1233363">
-            <a:off x="6400800" y="2468880"/>
-            <a:ext cx="548640" cy="365760"/>
-          </a:xfrm>
-          <a:prstGeom prst="rect">
-            <a:avLst/>
-          </a:prstGeom>
-          <a:solidFill>
-            <a:srgbClr val="FF9999"/>
-          </a:solidFill>
-          <a:ln w="12700">
-            <a:solidFill>
-              <a:srgbClr val="000000"/>
-            </a:solidFill>
-            <a:prstDash val="solid"/>
-          </a:ln>
-        </p:spPr>
-      </p:sp>
-      <p:sp>
-        <p:nvSpPr>
-          <p:cNvPr id="17" name="Shape 15"/>
-          <p:cNvSpPr/>
-          <p:nvPr/>
-        </p:nvSpPr>
-        <p:spPr>
-          <a:xfrm>
-            <a:off x="457200" y="3383280"/>
-            <a:ext cx="3840480" cy="1188720"/>
-          </a:xfrm>
-          <a:prstGeom prst="rect">
-            <a:avLst/>
-          </a:prstGeom>
-          <a:solidFill>
-            <a:srgbClr val="2A2A2A"/>
-          </a:solidFill>
-          <a:ln w="12700">
-            <a:solidFill>
-              <a:srgbClr val="555555"/>
-            </a:solidFill>
-            <a:prstDash val="solid"/>
-          </a:ln>
-        </p:spPr>
-      </p:sp>
-      <p:sp>
-        <p:nvSpPr>
-          <p:cNvPr id="18" name="Text 16"/>
-          <p:cNvSpPr/>
-          <p:nvPr/>
-        </p:nvSpPr>
-        <p:spPr>
-          <a:xfrm>
-            <a:off x="548640" y="3474720"/>
-            <a:ext cx="274320" cy="274320"/>
-          </a:xfrm>
-          <a:prstGeom prst="rect">
-            <a:avLst/>
-          </a:prstGeom>
-          <a:solidFill>
-            <a:srgbClr val="66B3FF"/>
-          </a:solidFill>
-          <a:ln/>
-        </p:spPr>
-        <p:txBody>
-          <a:bodyPr wrap="square" rtlCol="0" anchor="ctr"/>
-          <a:lstStyle/>
-          <a:p>
-            <a:pPr algn="ctr" indent="0" marL="0">
-              <a:buNone/>
-            </a:pPr>
-            <a:r>
-              <a:rPr lang="en-US" sz="1600" b="1" dirty="0">
-                <a:solidFill>
-                  <a:srgbClr val="FFFFFF"/>
-                </a:solidFill>
-              </a:rPr>
-              <a:t>C</a:t>
-            </a:r>
-            <a:endParaRPr lang="en-US" sz="1600" dirty="0"/>
-          </a:p>
-        </p:txBody>
-      </p:sp>
-      <p:sp>
-        <p:nvSpPr>
-          <p:cNvPr id="19" name="Shape 17"/>
-          <p:cNvSpPr/>
-          <p:nvPr/>
-        </p:nvSpPr>
-        <p:spPr>
-          <a:xfrm rot="1233363">
-            <a:off x="1737360" y="3749040"/>
-            <a:ext cx="548640" cy="365760"/>
-          </a:xfrm>
-          <a:prstGeom prst="rect">
-            <a:avLst/>
-          </a:prstGeom>
-          <a:solidFill>
-            <a:srgbClr val="66B3FF"/>
-          </a:solidFill>
-          <a:ln w="12700">
-            <a:solidFill>
-              <a:srgbClr val="000000"/>
-            </a:solidFill>
-            <a:prstDash val="solid"/>
-          </a:ln>
-        </p:spPr>
-      </p:sp>
-      <p:sp>
-        <p:nvSpPr>
-          <p:cNvPr id="20" name="Shape 18"/>
-          <p:cNvSpPr/>
-          <p:nvPr/>
-        </p:nvSpPr>
-        <p:spPr>
-          <a:xfrm>
-            <a:off x="1828800" y="4160520"/>
-            <a:ext cx="365760" cy="365760"/>
-          </a:xfrm>
-          <a:prstGeom prst="rect">
-            <a:avLst/>
-          </a:prstGeom>
-          <a:solidFill>
-            <a:srgbClr val="66B3FF"/>
-          </a:solidFill>
-          <a:ln w="12700">
-            <a:solidFill>
-              <a:srgbClr val="000000"/>
-            </a:solidFill>
-            <a:prstDash val="solid"/>
-          </a:ln>
-        </p:spPr>
-      </p:sp>
-      <p:sp>
-        <p:nvSpPr>
-          <p:cNvPr id="21" name="Shape 19"/>
-          <p:cNvSpPr/>
-          <p:nvPr/>
-        </p:nvSpPr>
-        <p:spPr>
-          <a:xfrm>
-            <a:off x="4754880" y="3383280"/>
-            <a:ext cx="3840480" cy="1188720"/>
-          </a:xfrm>
-          <a:prstGeom prst="rect">
-            <a:avLst/>
-          </a:prstGeom>
-          <a:solidFill>
-            <a:srgbClr val="2A2A2A"/>
-          </a:solidFill>
-          <a:ln w="12700">
-            <a:solidFill>
-              <a:srgbClr val="555555"/>
-            </a:solidFill>
-            <a:prstDash val="solid"/>
-          </a:ln>
-        </p:spPr>
-      </p:sp>
-      <p:sp>
-        <p:nvSpPr>
-          <p:cNvPr id="22" name="Text 20"/>
-          <p:cNvSpPr/>
-          <p:nvPr/>
-        </p:nvSpPr>
-        <p:spPr>
-          <a:xfrm>
-            <a:off x="4846320" y="3474720"/>
-            <a:ext cx="274320" cy="274320"/>
-          </a:xfrm>
-          <a:prstGeom prst="rect">
-            <a:avLst/>
-          </a:prstGeom>
-          <a:solidFill>
-            <a:srgbClr val="FF9999"/>
-          </a:solidFill>
-          <a:ln/>
-        </p:spPr>
-        <p:txBody>
-          <a:bodyPr wrap="square" rtlCol="0" anchor="ctr"/>
-          <a:lstStyle/>
-          <a:p>
-            <a:pPr algn="ctr" indent="0" marL="0">
-              <a:buNone/>
-            </a:pPr>
-            <a:r>
-              <a:rPr lang="en-US" sz="1600" b="1" dirty="0">
-                <a:solidFill>
-                  <a:srgbClr val="FFFFFF"/>
-                </a:solidFill>
-              </a:rPr>
-              <a:t>D</a:t>
-            </a:r>
-            <a:endParaRPr lang="en-US" sz="1600" dirty="0"/>
-          </a:p>
-        </p:txBody>
-      </p:sp>
-      <p:sp>
-        <p:nvSpPr>
-          <p:cNvPr id="23" name="Shape 21"/>
-          <p:cNvSpPr/>
-          <p:nvPr/>
-        </p:nvSpPr>
-        <p:spPr>
-          <a:xfrm>
-            <a:off x="6400800" y="3749040"/>
-            <a:ext cx="365760" cy="365760"/>
-          </a:xfrm>
-          <a:prstGeom prst="rect">
-            <a:avLst/>
-          </a:prstGeom>
-          <a:solidFill>
-            <a:srgbClr val="FF9999"/>
-          </a:solidFill>
-          <a:ln w="12700">
-            <a:solidFill>
-              <a:srgbClr val="000000"/>
-            </a:solidFill>
-            <a:prstDash val="solid"/>
-          </a:ln>
-        </p:spPr>
-      </p:sp>
-      <p:sp>
-        <p:nvSpPr>
-          <p:cNvPr id="24" name="Shape 22"/>
-          <p:cNvSpPr/>
-          <p:nvPr/>
-        </p:nvSpPr>
-        <p:spPr>
-          <a:xfrm rot="1233363">
-            <a:off x="6400800" y="4160520"/>
-            <a:ext cx="548640" cy="365760"/>
-          </a:xfrm>
-          <a:prstGeom prst="rect">
-            <a:avLst/>
-          </a:prstGeom>
-          <a:solidFill>
-            <a:srgbClr val="FF9999"/>
-          </a:solidFill>
-          <a:ln w="12700">
-            <a:solidFill>
-              <a:srgbClr val="000000"/>
-            </a:solidFill>
-            <a:prstDash val="solid"/>
-          </a:ln>
-        </p:spPr>
-      </p:sp>
-      <p:sp>
-        <p:nvSpPr>
-          <p:cNvPr id="25" name="Shape 23">
-            <a:hlinkClick r:id="rId1" tooltip="" action="ppaction://hlinksldjump"/>
+      <p:pic>
+        <p:nvPicPr>
+          <p:cNvPr id="16" name="Image 3" descr="q7-answer-d.png">    </p:cNvPr>
+          <p:cNvPicPr>
+            <a:picLocks noChangeAspect="1"/>
+          </p:cNvPicPr>
+          <p:nvPr/>
+        </p:nvPicPr>
+        <p:blipFill>
+          <a:blip r:embed="rId4"/>
+          <a:stretch>
+            <a:fillRect/>
+          </a:stretch>
+        </p:blipFill>
+        <p:spPr>
+          <a:xfrm>
+            <a:off x="5669280" y="3383280"/>
+            <a:ext cx="2286000" cy="914400"/>
+          </a:xfrm>
+          <a:prstGeom prst="rect">
+            <a:avLst/>
+          </a:prstGeom>
+        </p:spPr>
+      </p:pic>
+      <p:sp>
+        <p:nvSpPr>
+          <p:cNvPr id="17" name="Shape 11">
+            <a:hlinkClick r:id="rId5" tooltip="" action="ppaction://hlinksldjump"/>
           </p:cNvPr>
           <p:cNvSpPr/>
           <p:nvPr/>
         </p:nvSpPr>
         <p:spPr>
           <a:xfrm>
-            <a:off x="457200" y="2011680"/>
-            <a:ext cx="3840480" cy="1188720"/>
+            <a:off x="457200" y="1645920"/>
+            <a:ext cx="3840480" cy="1371600"/>
           </a:xfrm>
           <a:prstGeom prst="rect">
             <a:avLst/>
@@ -7201,16 +6459,16 @@
       </p:sp>
       <p:sp>
         <p:nvSpPr>
-          <p:cNvPr id="26" name="Shape 24">
-            <a:hlinkClick r:id="rId2" tooltip="" action="ppaction://hlinksldjump"/>
+          <p:cNvPr id="18" name="Shape 12">
+            <a:hlinkClick r:id="rId6" tooltip="" action="ppaction://hlinksldjump"/>
           </p:cNvPr>
           <p:cNvSpPr/>
           <p:nvPr/>
         </p:nvSpPr>
         <p:spPr>
           <a:xfrm>
-            <a:off x="4754880" y="2011680"/>
-            <a:ext cx="3840480" cy="1188720"/>
+            <a:off x="4754880" y="1645920"/>
+            <a:ext cx="3840480" cy="1371600"/>
           </a:xfrm>
           <a:prstGeom prst="rect">
             <a:avLst/>
@@ -7230,16 +6488,16 @@
       </p:sp>
       <p:sp>
         <p:nvSpPr>
-          <p:cNvPr id="27" name="Shape 25">
-            <a:hlinkClick r:id="rId3" tooltip="" action="ppaction://hlinksldjump"/>
+          <p:cNvPr id="19" name="Shape 13">
+            <a:hlinkClick r:id="rId7" tooltip="" action="ppaction://hlinksldjump"/>
           </p:cNvPr>
           <p:cNvSpPr/>
           <p:nvPr/>
         </p:nvSpPr>
         <p:spPr>
           <a:xfrm>
-            <a:off x="457200" y="3383280"/>
-            <a:ext cx="3840480" cy="1188720"/>
+            <a:off x="457200" y="3200400"/>
+            <a:ext cx="3840480" cy="1371600"/>
           </a:xfrm>
           <a:prstGeom prst="rect">
             <a:avLst/>
@@ -7259,16 +6517,16 @@
       </p:sp>
       <p:sp>
         <p:nvSpPr>
-          <p:cNvPr id="28" name="Shape 26">
-            <a:hlinkClick r:id="rId4" tooltip="" action="ppaction://hlinksldjump"/>
+          <p:cNvPr id="20" name="Shape 14">
+            <a:hlinkClick r:id="rId8" tooltip="" action="ppaction://hlinksldjump"/>
           </p:cNvPr>
           <p:cNvSpPr/>
           <p:nvPr/>
         </p:nvSpPr>
         <p:spPr>
           <a:xfrm>
-            <a:off x="4754880" y="3383280"/>
-            <a:ext cx="3840480" cy="1188720"/>
+            <a:off x="4754880" y="3200400"/>
+            <a:ext cx="3840480" cy="1371600"/>
           </a:xfrm>
           <a:prstGeom prst="rect">
             <a:avLst/>
@@ -7400,8 +6658,8 @@
         </p:nvSpPr>
         <p:spPr>
           <a:xfrm>
-            <a:off x="457200" y="2286000"/>
-            <a:ext cx="3840480" cy="1188720"/>
+            <a:off x="3200400" y="2286000"/>
+            <a:ext cx="3840480" cy="1371600"/>
           </a:xfrm>
           <a:prstGeom prst="rect">
             <a:avLst/>
@@ -7425,7 +6683,7 @@
         </p:nvSpPr>
         <p:spPr>
           <a:xfrm>
-            <a:off x="548640" y="2377440"/>
+            <a:off x="3291840" y="2377440"/>
             <a:ext cx="274320" cy="274320"/>
           </a:xfrm>
           <a:prstGeom prst="rect">
@@ -7457,57 +6715,67 @@
       </p:sp>
       <p:sp>
         <p:nvSpPr>
-          <p:cNvPr id="6" name="Shape 4"/>
-          <p:cNvSpPr/>
-          <p:nvPr/>
-        </p:nvSpPr>
-        <p:spPr>
-          <a:xfrm rot="1233363">
-            <a:off x="1737360" y="2651760"/>
-            <a:ext cx="548640" cy="365760"/>
-          </a:xfrm>
-          <a:prstGeom prst="rect">
-            <a:avLst/>
-          </a:prstGeom>
-          <a:solidFill>
-            <a:srgbClr val="66B3FF"/>
-          </a:solidFill>
-          <a:ln w="12700">
-            <a:solidFill>
-              <a:srgbClr val="000000"/>
-            </a:solidFill>
-            <a:prstDash val="solid"/>
-          </a:ln>
-        </p:spPr>
-      </p:sp>
-      <p:sp>
-        <p:nvSpPr>
-          <p:cNvPr id="7" name="Shape 5"/>
-          <p:cNvSpPr/>
-          <p:nvPr/>
-        </p:nvSpPr>
-        <p:spPr>
-          <a:xfrm>
-            <a:off x="1828800" y="3063240"/>
-            <a:ext cx="365760" cy="365760"/>
-          </a:xfrm>
-          <a:prstGeom prst="rect">
-            <a:avLst/>
-          </a:prstGeom>
-          <a:solidFill>
-            <a:srgbClr val="66B3FF"/>
-          </a:solidFill>
-          <a:ln w="12700">
-            <a:solidFill>
-              <a:srgbClr val="000000"/>
-            </a:solidFill>
-            <a:prstDash val="solid"/>
-          </a:ln>
-        </p:spPr>
-      </p:sp>
-      <p:sp>
-        <p:nvSpPr>
-          <p:cNvPr id="8" name="Shape 6"/>
+          <p:cNvPr id="6" name="Text 4"/>
+          <p:cNvSpPr/>
+          <p:nvPr/>
+        </p:nvSpPr>
+        <p:spPr>
+          <a:xfrm>
+            <a:off x="3657600" y="2377440"/>
+            <a:ext cx="3200400" cy="274320"/>
+          </a:xfrm>
+          <a:prstGeom prst="rect">
+            <a:avLst/>
+          </a:prstGeom>
+          <a:noFill/>
+          <a:ln/>
+        </p:spPr>
+        <p:txBody>
+          <a:bodyPr wrap="square" rtlCol="0" anchor="ctr"/>
+          <a:lstStyle/>
+          <a:p>
+            <a:pPr indent="0" marL="0">
+              <a:buNone/>
+            </a:pPr>
+            <a:r>
+              <a:rPr lang="en-US" sz="1400" b="1" dirty="0">
+                <a:solidFill>
+                  <a:srgbClr val="2ECC71"/>
+                </a:solidFill>
+              </a:rPr>
+              <a:t>✓ Correct Answer</a:t>
+            </a:r>
+            <a:endParaRPr lang="en-US" sz="1400" dirty="0"/>
+          </a:p>
+        </p:txBody>
+      </p:sp>
+      <p:pic>
+        <p:nvPicPr>
+          <p:cNvPr id="7" name="Image 0" descr="q7-answer-c.png">    </p:cNvPr>
+          <p:cNvPicPr>
+            <a:picLocks noChangeAspect="1"/>
+          </p:cNvPicPr>
+          <p:nvPr/>
+        </p:nvPicPr>
+        <p:blipFill>
+          <a:blip r:embed="rId1"/>
+          <a:stretch>
+            <a:fillRect/>
+          </a:stretch>
+        </p:blipFill>
+        <p:spPr>
+          <a:xfrm>
+            <a:off x="4114800" y="2651760"/>
+            <a:ext cx="2286000" cy="914400"/>
+          </a:xfrm>
+          <a:prstGeom prst="rect">
+            <a:avLst/>
+          </a:prstGeom>
+        </p:spPr>
+      </p:pic>
+      <p:sp>
+        <p:nvSpPr>
+          <p:cNvPr id="8" name="Shape 5"/>
           <p:cNvSpPr/>
           <p:nvPr/>
         </p:nvSpPr>
@@ -7532,8 +6800,8 @@
       </p:sp>
       <p:sp>
         <p:nvSpPr>
-          <p:cNvPr id="9" name="Text 7">
-            <a:hlinkClick r:id="rId1" tooltip="" action="ppaction://hlinksldjump"/>
+          <p:cNvPr id="9" name="Text 6">
+            <a:hlinkClick r:id="rId2" tooltip="" action="ppaction://hlinksldjump"/>
           </p:cNvPr>
           <p:cNvSpPr/>
           <p:nvPr/>
@@ -7561,7 +6829,7 @@
                 <a:solidFill>
                   <a:srgbClr val="FFFFFF"/>
                 </a:solidFill>
-                <a:hlinkClick r:id="rId1" action="ppaction://hlinksldjump" tooltip="">
+                <a:hlinkClick r:id="rId2" action="ppaction://hlinksldjump" tooltip="">
                   <a:extLst>
                     <a:ext uri="{A12FA001-AC4F-418D-AE19-62706E023703}">
                       <ahyp:hlinkClr xmlns:ahyp="http://schemas.microsoft.com/office/drawing/2018/hyperlinkcolor" val="tx"/>

</xml_diff>